<commit_message>
Hoàn thành báo cáo ppt và báo cáo lv
</commit_message>
<xml_diff>
--- a/Docs/Report/DD_RFID_FinalReport_v1.0.pptx
+++ b/Docs/Report/DD_RFID_FinalReport_v1.0.pptx
@@ -5,7 +5,7 @@
     <p:sldMasterId id="2147483648" r:id="rId1"/>
   </p:sldMasterIdLst>
   <p:notesMasterIdLst>
-    <p:notesMasterId r:id="rId17"/>
+    <p:notesMasterId r:id="rId18"/>
   </p:notesMasterIdLst>
   <p:sldIdLst>
     <p:sldId id="256" r:id="rId2"/>
@@ -18,11 +18,12 @@
     <p:sldId id="275" r:id="rId9"/>
     <p:sldId id="276" r:id="rId10"/>
     <p:sldId id="297" r:id="rId11"/>
-    <p:sldId id="290" r:id="rId12"/>
-    <p:sldId id="291" r:id="rId13"/>
-    <p:sldId id="292" r:id="rId14"/>
-    <p:sldId id="262" r:id="rId15"/>
-    <p:sldId id="293" r:id="rId16"/>
+    <p:sldId id="298" r:id="rId12"/>
+    <p:sldId id="290" r:id="rId13"/>
+    <p:sldId id="291" r:id="rId14"/>
+    <p:sldId id="292" r:id="rId15"/>
+    <p:sldId id="262" r:id="rId16"/>
+    <p:sldId id="293" r:id="rId17"/>
   </p:sldIdLst>
   <p:sldSz cx="9144000" cy="6858000" type="screen4x3"/>
   <p:notesSz cx="6858000" cy="9144000"/>
@@ -3621,7 +3622,7 @@
           <a:p>
             <a:fld id="{AB5E797F-F015-4070-9F9C-4517C09B7E92}" type="slidenum">
               <a:rPr lang="en-US" smtClean="0"/>
-              <a:t>14</a:t>
+              <a:t>15</a:t>
             </a:fld>
             <a:endParaRPr lang="en-US"/>
           </a:p>
@@ -5600,31 +5601,6 @@
       </p:sp>
       <p:sp>
         <p:nvSpPr>
-          <p:cNvPr id="3" name="Content Placeholder 2">
-            <a:extLst>
-              <a:ext uri="{FF2B5EF4-FFF2-40B4-BE49-F238E27FC236}">
-                <a16:creationId xmlns:a16="http://schemas.microsoft.com/office/drawing/2014/main" id="{3E3F79A3-D402-41A2-B736-E4BCE5D00897}"/>
-              </a:ext>
-            </a:extLst>
-          </p:cNvPr>
-          <p:cNvSpPr>
-            <a:spLocks noGrp="1"/>
-          </p:cNvSpPr>
-          <p:nvPr>
-            <p:ph idx="1"/>
-          </p:nvPr>
-        </p:nvSpPr>
-        <p:spPr/>
-        <p:txBody>
-          <a:bodyPr/>
-          <a:lstStyle/>
-          <a:p>
-            <a:endParaRPr lang="en-US"/>
-          </a:p>
-        </p:txBody>
-      </p:sp>
-      <p:sp>
-        <p:nvSpPr>
           <p:cNvPr id="4" name="Slide Number Placeholder 3">
             <a:extLst>
               <a:ext uri="{FF2B5EF4-FFF2-40B4-BE49-F238E27FC236}">
@@ -5658,6 +5634,97 @@
           </a:p>
         </p:txBody>
       </p:sp>
+      <p:pic>
+        <p:nvPicPr>
+          <p:cNvPr id="1026" name="Picture 2" descr="Kết quả hình ảnh cho demo">
+            <a:hlinkClick r:id="rId2"/>
+            <a:extLst>
+              <a:ext uri="{FF2B5EF4-FFF2-40B4-BE49-F238E27FC236}">
+                <a16:creationId xmlns:a16="http://schemas.microsoft.com/office/drawing/2014/main" id="{25D2D659-A419-40EF-8409-5CE6E95F583E}"/>
+              </a:ext>
+            </a:extLst>
+          </p:cNvPr>
+          <p:cNvPicPr>
+            <a:picLocks noChangeAspect="1" noChangeArrowheads="1"/>
+          </p:cNvPicPr>
+          <p:nvPr/>
+        </p:nvPicPr>
+        <p:blipFill>
+          <a:blip r:embed="rId3">
+            <a:extLst>
+              <a:ext uri="{BEBA8EAE-BF5A-486C-A8C5-ECC9F3942E4B}">
+                <a14:imgProps xmlns:a14="http://schemas.microsoft.com/office/drawing/2010/main">
+                  <a14:imgLayer r:embed="rId4">
+                    <a14:imgEffect>
+                      <a14:backgroundRemoval t="4667" b="97667" l="3111" r="96444">
+                        <a14:foregroundMark x1="38000" y1="12333" x2="38556" y2="55667"/>
+                        <a14:foregroundMark x1="63222" y1="11889" x2="55444" y2="68111"/>
+                        <a14:foregroundMark x1="79000" y1="22222" x2="90111" y2="51556"/>
+                        <a14:foregroundMark x1="90111" y1="58222" x2="26444" y2="67556"/>
+                        <a14:foregroundMark x1="10444" y1="42111" x2="9889" y2="63778"/>
+                        <a14:foregroundMark x1="14000" y1="67778" x2="31000" y2="85222"/>
+                        <a14:foregroundMark x1="38111" y1="88000" x2="65778" y2="87333"/>
+                        <a14:foregroundMark x1="70222" y1="82667" x2="77111" y2="53889"/>
+                        <a14:foregroundMark x1="24556" y1="75667" x2="26556" y2="74889"/>
+                        <a14:foregroundMark x1="16556" y1="59444" x2="16556" y2="59444"/>
+                        <a14:foregroundMark x1="13444" y1="33444" x2="25111" y2="39778"/>
+                        <a14:foregroundMark x1="17889" y1="21778" x2="34222" y2="35444"/>
+                        <a14:foregroundMark x1="28667" y1="15111" x2="37556" y2="34444"/>
+                        <a14:foregroundMark x1="51667" y1="10444" x2="49222" y2="30222"/>
+                        <a14:foregroundMark x1="89556" y1="44444" x2="79444" y2="46444"/>
+                        <a14:foregroundMark x1="87778" y1="53667" x2="82111" y2="52333"/>
+                        <a14:foregroundMark x1="83667" y1="67889" x2="75444" y2="62222"/>
+                        <a14:foregroundMark x1="78556" y1="75444" x2="76444" y2="68556"/>
+                        <a14:foregroundMark x1="64667" y1="85667" x2="61111" y2="77667"/>
+                        <a14:foregroundMark x1="42778" y1="87333" x2="50000" y2="79778"/>
+                        <a14:foregroundMark x1="30444" y1="81778" x2="41222" y2="75444"/>
+                        <a14:foregroundMark x1="58222" y1="87000" x2="52000" y2="78111"/>
+                        <a14:foregroundMark x1="36444" y1="86444" x2="42444" y2="77333"/>
+                        <a14:foregroundMark x1="17000" y1="69778" x2="35333" y2="65444"/>
+                        <a14:foregroundMark x1="15556" y1="42778" x2="16667" y2="69111"/>
+                        <a14:foregroundMark x1="24556" y1="41222" x2="29667" y2="40000"/>
+                        <a14:foregroundMark x1="32222" y1="48333" x2="33222" y2="57000"/>
+                        <a14:foregroundMark x1="24667" y1="51667" x2="27667" y2="59889"/>
+                        <a14:foregroundMark x1="43111" y1="52333" x2="42889" y2="64000"/>
+                        <a14:foregroundMark x1="56444" y1="38556" x2="44889" y2="60444"/>
+                        <a14:foregroundMark x1="65556" y1="36778" x2="81667" y2="69778"/>
+                        <a14:foregroundMark x1="64667" y1="61778" x2="83222" y2="46000"/>
+                        <a14:foregroundMark x1="59111" y1="47222" x2="63222" y2="56333"/>
+                      </a14:backgroundRemoval>
+                    </a14:imgEffect>
+                  </a14:imgLayer>
+                </a14:imgProps>
+              </a:ext>
+              <a:ext uri="{28A0092B-C50C-407E-A947-70E740481C1C}">
+                <a14:useLocalDpi xmlns:a14="http://schemas.microsoft.com/office/drawing/2010/main" val="0"/>
+              </a:ext>
+            </a:extLst>
+          </a:blip>
+          <a:srcRect/>
+          <a:stretch>
+            <a:fillRect/>
+          </a:stretch>
+        </p:blipFill>
+        <p:spPr bwMode="auto">
+          <a:xfrm>
+            <a:off x="2514600" y="1905000"/>
+            <a:ext cx="4114800" cy="4114800"/>
+          </a:xfrm>
+          <a:prstGeom prst="rect">
+            <a:avLst/>
+          </a:prstGeom>
+          <a:noFill/>
+          <a:extLst>
+            <a:ext uri="{909E8E84-426E-40DD-AFC4-6F175D3DCCD1}">
+              <a14:hiddenFill xmlns:a14="http://schemas.microsoft.com/office/drawing/2010/main">
+                <a:solidFill>
+                  <a:srgbClr val="FFFFFF"/>
+                </a:solidFill>
+              </a14:hiddenFill>
+            </a:ext>
+          </a:extLst>
+        </p:spPr>
+      </p:pic>
     </p:spTree>
     <p:extLst>
       <p:ext uri="{BB962C8B-B14F-4D97-AF65-F5344CB8AC3E}">
@@ -5706,7 +5773,142 @@
             <a:pPr algn="ctr"/>
             <a:r>
               <a:rPr lang="en-US"/>
-              <a:t>Kêt quả đạt đ</a:t>
+              <a:t>Phần 3: Tổng kết</a:t>
+            </a:r>
+          </a:p>
+        </p:txBody>
+      </p:sp>
+      <p:sp>
+        <p:nvSpPr>
+          <p:cNvPr id="3" name="Content Placeholder 2"/>
+          <p:cNvSpPr>
+            <a:spLocks noGrp="1"/>
+          </p:cNvSpPr>
+          <p:nvPr>
+            <p:ph idx="1"/>
+          </p:nvPr>
+        </p:nvSpPr>
+        <p:spPr/>
+        <p:txBody>
+          <a:bodyPr/>
+          <a:lstStyle/>
+          <a:p>
+            <a:r>
+              <a:rPr lang="en-US" sz="2600"/>
+              <a:t>Kết quả đạt đ</a:t>
+            </a:r>
+            <a:r>
+              <a:rPr lang="vi-VN" sz="2600"/>
+              <a:t>ư</a:t>
+            </a:r>
+            <a:r>
+              <a:rPr lang="en-US" sz="2600"/>
+              <a:t>ợc.</a:t>
+            </a:r>
+          </a:p>
+          <a:p>
+            <a:r>
+              <a:rPr lang="en-US" sz="2600"/>
+              <a:t>Hạn chế.</a:t>
+            </a:r>
+          </a:p>
+          <a:p>
+            <a:r>
+              <a:rPr lang="en-US" sz="2600"/>
+              <a:t>H</a:t>
+            </a:r>
+            <a:r>
+              <a:rPr lang="vi-VN" sz="2600"/>
+              <a:t>ư</a:t>
+            </a:r>
+            <a:r>
+              <a:rPr lang="en-US" sz="2600"/>
+              <a:t>ớng phát triển.</a:t>
+            </a:r>
+          </a:p>
+        </p:txBody>
+      </p:sp>
+      <p:sp>
+        <p:nvSpPr>
+          <p:cNvPr id="4" name="Slide Number Placeholder 3"/>
+          <p:cNvSpPr>
+            <a:spLocks noGrp="1"/>
+          </p:cNvSpPr>
+          <p:nvPr>
+            <p:ph type="sldNum" sz="quarter" idx="12"/>
+          </p:nvPr>
+        </p:nvSpPr>
+        <p:spPr/>
+        <p:txBody>
+          <a:bodyPr/>
+          <a:lstStyle/>
+          <a:p>
+            <a:pPr>
+              <a:defRPr/>
+            </a:pPr>
+            <a:fld id="{20CDDA0F-6228-4D21-A34F-D991946E76B9}" type="slidenum">
+              <a:rPr lang="en-US" altLang="en-US" smtClean="0"/>
+              <a:pPr>
+                <a:defRPr/>
+              </a:pPr>
+              <a:t>11</a:t>
+            </a:fld>
+            <a:endParaRPr lang="en-US" altLang="en-US"/>
+          </a:p>
+        </p:txBody>
+      </p:sp>
+    </p:spTree>
+    <p:extLst>
+      <p:ext uri="{BB962C8B-B14F-4D97-AF65-F5344CB8AC3E}">
+        <p14:creationId xmlns:p14="http://schemas.microsoft.com/office/powerpoint/2010/main" val="3134744520"/>
+      </p:ext>
+    </p:extLst>
+  </p:cSld>
+  <p:clrMapOvr>
+    <a:masterClrMapping/>
+  </p:clrMapOvr>
+  <p:transition spd="med">
+    <p:pull/>
+  </p:transition>
+</p:sld>
+</file>
+
+<file path=ppt/slides/slide12.xml><?xml version="1.0" encoding="utf-8"?>
+<p:sld xmlns:a="http://schemas.openxmlformats.org/drawingml/2006/main" xmlns:r="http://schemas.openxmlformats.org/officeDocument/2006/relationships" xmlns:p="http://schemas.openxmlformats.org/presentationml/2006/main">
+  <p:cSld>
+    <p:spTree>
+      <p:nvGrpSpPr>
+        <p:cNvPr id="1" name=""/>
+        <p:cNvGrpSpPr/>
+        <p:nvPr/>
+      </p:nvGrpSpPr>
+      <p:grpSpPr>
+        <a:xfrm>
+          <a:off x="0" y="0"/>
+          <a:ext cx="0" cy="0"/>
+          <a:chOff x="0" y="0"/>
+          <a:chExt cx="0" cy="0"/>
+        </a:xfrm>
+      </p:grpSpPr>
+      <p:sp>
+        <p:nvSpPr>
+          <p:cNvPr id="2" name="Title 1"/>
+          <p:cNvSpPr>
+            <a:spLocks noGrp="1"/>
+          </p:cNvSpPr>
+          <p:nvPr>
+            <p:ph type="title"/>
+          </p:nvPr>
+        </p:nvSpPr>
+        <p:spPr/>
+        <p:txBody>
+          <a:bodyPr/>
+          <a:lstStyle/>
+          <a:p>
+            <a:pPr algn="ctr"/>
+            <a:r>
+              <a:rPr lang="en-US"/>
+              <a:t>Kết quả đạt đ</a:t>
             </a:r>
             <a:r>
               <a:rPr lang="vi-VN"/>
@@ -5742,7 +5944,7 @@
               <a:pPr>
                 <a:defRPr/>
               </a:pPr>
-              <a:t>11</a:t>
+              <a:t>12</a:t>
             </a:fld>
             <a:endParaRPr lang="en-US" altLang="en-US"/>
           </a:p>
@@ -5775,73 +5977,33 @@
           <a:lstStyle/>
           <a:p>
             <a:r>
-              <a:rPr lang="en-US" sz="2600"/>
-              <a:t>Kết quả đạt được</a:t>
-            </a:r>
-            <a:endParaRPr lang="vi-VN" sz="2600"/>
+              <a:rPr lang="en-US" sz="2700"/>
+              <a:t>Hoàn thành các chức năng đã đề ra. </a:t>
+            </a:r>
           </a:p>
           <a:p>
-            <a:pPr lvl="1"/>
-            <a:r>
-              <a:rPr lang="vi-VN" sz="2000"/>
-              <a:t>Tìm hiểu phân tích, thiết kế hệ thống thông tin.</a:t>
+            <a:r>
+              <a:rPr lang="en-US" sz="2700"/>
+              <a:t>Các chức năng hoạt động đúng sau khi đã qua kiểm thử.</a:t>
             </a:r>
           </a:p>
           <a:p>
-            <a:pPr lvl="1"/>
-            <a:r>
-              <a:rPr lang="vi-VN" sz="2000"/>
-              <a:t>Phương pháp phân tích thiết kế cơ sỡ dữ liệu.</a:t>
+            <a:r>
+              <a:rPr lang="en-US" sz="2700"/>
+              <a:t>Chức năng điểm danh phản hồi kết quả kịp tốc độ quét thẻ liên tục của đầu đọc.</a:t>
             </a:r>
           </a:p>
           <a:p>
-            <a:pPr lvl="1"/>
-            <a:r>
-              <a:rPr lang="vi-VN" sz="2000"/>
-              <a:t>Nghiên cứu các ngôn ngữ PHP, HTML, CSS, Javascript.</a:t>
+            <a:r>
+              <a:rPr lang="en-US" sz="2700"/>
+              <a:t>Các chức năng đăng ký thẻ linh hoạt, có thể cập nhật mã thẻ bằng nhiều cách khác nhau.</a:t>
             </a:r>
           </a:p>
           <a:p>
-            <a:pPr lvl="1"/>
-            <a:r>
-              <a:rPr lang="vi-VN" sz="2000"/>
-              <a:t>Nắm vững kiến thức về boostrap, jquery, Laravel Framework.</a:t>
-            </a:r>
-          </a:p>
-          <a:p>
-            <a:pPr lvl="1"/>
-            <a:r>
-              <a:rPr lang="vi-VN" sz="2000"/>
-              <a:t>Các kiến thức nền tản cho lập trình web.</a:t>
-            </a:r>
-          </a:p>
-          <a:p>
-            <a:r>
-              <a:rPr lang="vi-VN" sz="2600"/>
-              <a:t>Về kỹ thuật</a:t>
-            </a:r>
-          </a:p>
-          <a:p>
-            <a:pPr lvl="1"/>
-            <a:r>
-              <a:rPr lang="vi-VN" sz="2000"/>
-              <a:t>Xây dựng website với boostrap, jquery.</a:t>
-            </a:r>
-          </a:p>
-          <a:p>
-            <a:pPr lvl="1"/>
-            <a:r>
-              <a:rPr lang="vi-VN" sz="2000"/>
-              <a:t>Sử dụng Laravel Framework để tạo cấu trúc và phát triển hệ thống.</a:t>
-            </a:r>
-          </a:p>
-          <a:p>
-            <a:pPr lvl="1"/>
-            <a:r>
-              <a:rPr lang="vi-VN" sz="2000"/>
-              <a:t>Sử dụng và phát triển web với Laravel Framework, bắt và xử lý sự kiện countdown jquery.</a:t>
-            </a:r>
-            <a:endParaRPr lang="en-US" sz="2000"/>
+            <a:r>
+              <a:rPr lang="en-US" sz="2700"/>
+              <a:t>Được học hỏi thêm nhiều kinh nghiệm xây dựng web, phát triển phần mềm và kỹ thuật lập trình.</a:t>
+            </a:r>
           </a:p>
         </p:txBody>
       </p:sp>
@@ -5870,6 +6032,9 @@
                     <p:cTn id="3" fill="hold">
                       <p:stCondLst>
                         <p:cond delay="indefinite"/>
+                        <p:cond evt="onBegin" delay="0">
+                          <p:tn val="2"/>
+                        </p:cond>
                       </p:stCondLst>
                       <p:childTnLst>
                         <p:par>
@@ -5879,7 +6044,7 @@
                             </p:stCondLst>
                             <p:childTnLst>
                               <p:par>
-                                <p:cTn id="5" presetID="10" presetClass="entr" presetSubtype="0" fill="hold" nodeType="clickEffect">
+                                <p:cTn id="5" presetID="10" presetClass="entr" presetSubtype="0" fill="hold" nodeType="withEffect">
                                   <p:stCondLst>
                                     <p:cond delay="0"/>
                                   </p:stCondLst>
@@ -6093,950 +6258,6 @@
                                   </p:childTnLst>
                                 </p:cTn>
                               </p:par>
-                              <p:par>
-                                <p:cTn id="20" presetID="10" presetClass="entr" presetSubtype="0" fill="hold" nodeType="withEffect">
-                                  <p:stCondLst>
-                                    <p:cond delay="0"/>
-                                  </p:stCondLst>
-                                  <p:childTnLst>
-                                    <p:set>
-                                      <p:cBhvr>
-                                        <p:cTn id="21" dur="1" fill="hold">
-                                          <p:stCondLst>
-                                            <p:cond delay="0"/>
-                                          </p:stCondLst>
-                                        </p:cTn>
-                                        <p:tgtEl>
-                                          <p:spTgt spid="7">
-                                            <p:txEl>
-                                              <p:pRg st="5" end="5"/>
-                                            </p:txEl>
-                                          </p:spTgt>
-                                        </p:tgtEl>
-                                        <p:attrNameLst>
-                                          <p:attrName>style.visibility</p:attrName>
-                                        </p:attrNameLst>
-                                      </p:cBhvr>
-                                      <p:to>
-                                        <p:strVal val="visible"/>
-                                      </p:to>
-                                    </p:set>
-                                    <p:animEffect transition="in" filter="fade">
-                                      <p:cBhvr>
-                                        <p:cTn id="22" dur="500"/>
-                                        <p:tgtEl>
-                                          <p:spTgt spid="7">
-                                            <p:txEl>
-                                              <p:pRg st="5" end="5"/>
-                                            </p:txEl>
-                                          </p:spTgt>
-                                        </p:tgtEl>
-                                      </p:cBhvr>
-                                    </p:animEffect>
-                                  </p:childTnLst>
-                                </p:cTn>
-                              </p:par>
-                              <p:par>
-                                <p:cTn id="23" presetID="10" presetClass="entr" presetSubtype="0" fill="hold" nodeType="withEffect">
-                                  <p:stCondLst>
-                                    <p:cond delay="0"/>
-                                  </p:stCondLst>
-                                  <p:childTnLst>
-                                    <p:set>
-                                      <p:cBhvr>
-                                        <p:cTn id="24" dur="1" fill="hold">
-                                          <p:stCondLst>
-                                            <p:cond delay="0"/>
-                                          </p:stCondLst>
-                                        </p:cTn>
-                                        <p:tgtEl>
-                                          <p:spTgt spid="7">
-                                            <p:txEl>
-                                              <p:pRg st="6" end="6"/>
-                                            </p:txEl>
-                                          </p:spTgt>
-                                        </p:tgtEl>
-                                        <p:attrNameLst>
-                                          <p:attrName>style.visibility</p:attrName>
-                                        </p:attrNameLst>
-                                      </p:cBhvr>
-                                      <p:to>
-                                        <p:strVal val="visible"/>
-                                      </p:to>
-                                    </p:set>
-                                    <p:animEffect transition="in" filter="fade">
-                                      <p:cBhvr>
-                                        <p:cTn id="25" dur="500"/>
-                                        <p:tgtEl>
-                                          <p:spTgt spid="7">
-                                            <p:txEl>
-                                              <p:pRg st="6" end="6"/>
-                                            </p:txEl>
-                                          </p:spTgt>
-                                        </p:tgtEl>
-                                      </p:cBhvr>
-                                    </p:animEffect>
-                                  </p:childTnLst>
-                                </p:cTn>
-                              </p:par>
-                              <p:par>
-                                <p:cTn id="26" presetID="10" presetClass="entr" presetSubtype="0" fill="hold" nodeType="withEffect">
-                                  <p:stCondLst>
-                                    <p:cond delay="0"/>
-                                  </p:stCondLst>
-                                  <p:childTnLst>
-                                    <p:set>
-                                      <p:cBhvr>
-                                        <p:cTn id="27" dur="1" fill="hold">
-                                          <p:stCondLst>
-                                            <p:cond delay="0"/>
-                                          </p:stCondLst>
-                                        </p:cTn>
-                                        <p:tgtEl>
-                                          <p:spTgt spid="7">
-                                            <p:txEl>
-                                              <p:pRg st="7" end="7"/>
-                                            </p:txEl>
-                                          </p:spTgt>
-                                        </p:tgtEl>
-                                        <p:attrNameLst>
-                                          <p:attrName>style.visibility</p:attrName>
-                                        </p:attrNameLst>
-                                      </p:cBhvr>
-                                      <p:to>
-                                        <p:strVal val="visible"/>
-                                      </p:to>
-                                    </p:set>
-                                    <p:animEffect transition="in" filter="fade">
-                                      <p:cBhvr>
-                                        <p:cTn id="28" dur="500"/>
-                                        <p:tgtEl>
-                                          <p:spTgt spid="7">
-                                            <p:txEl>
-                                              <p:pRg st="7" end="7"/>
-                                            </p:txEl>
-                                          </p:spTgt>
-                                        </p:tgtEl>
-                                      </p:cBhvr>
-                                    </p:animEffect>
-                                  </p:childTnLst>
-                                </p:cTn>
-                              </p:par>
-                              <p:par>
-                                <p:cTn id="29" presetID="10" presetClass="entr" presetSubtype="0" fill="hold" nodeType="withEffect">
-                                  <p:stCondLst>
-                                    <p:cond delay="0"/>
-                                  </p:stCondLst>
-                                  <p:childTnLst>
-                                    <p:set>
-                                      <p:cBhvr>
-                                        <p:cTn id="30" dur="1" fill="hold">
-                                          <p:stCondLst>
-                                            <p:cond delay="0"/>
-                                          </p:stCondLst>
-                                        </p:cTn>
-                                        <p:tgtEl>
-                                          <p:spTgt spid="7">
-                                            <p:txEl>
-                                              <p:pRg st="8" end="8"/>
-                                            </p:txEl>
-                                          </p:spTgt>
-                                        </p:tgtEl>
-                                        <p:attrNameLst>
-                                          <p:attrName>style.visibility</p:attrName>
-                                        </p:attrNameLst>
-                                      </p:cBhvr>
-                                      <p:to>
-                                        <p:strVal val="visible"/>
-                                      </p:to>
-                                    </p:set>
-                                    <p:animEffect transition="in" filter="fade">
-                                      <p:cBhvr>
-                                        <p:cTn id="31" dur="500"/>
-                                        <p:tgtEl>
-                                          <p:spTgt spid="7">
-                                            <p:txEl>
-                                              <p:pRg st="8" end="8"/>
-                                            </p:txEl>
-                                          </p:spTgt>
-                                        </p:tgtEl>
-                                      </p:cBhvr>
-                                    </p:animEffect>
-                                  </p:childTnLst>
-                                </p:cTn>
-                              </p:par>
-                              <p:par>
-                                <p:cTn id="32" presetID="10" presetClass="entr" presetSubtype="0" fill="hold" nodeType="withEffect">
-                                  <p:stCondLst>
-                                    <p:cond delay="0"/>
-                                  </p:stCondLst>
-                                  <p:childTnLst>
-                                    <p:set>
-                                      <p:cBhvr>
-                                        <p:cTn id="33" dur="1" fill="hold">
-                                          <p:stCondLst>
-                                            <p:cond delay="0"/>
-                                          </p:stCondLst>
-                                        </p:cTn>
-                                        <p:tgtEl>
-                                          <p:spTgt spid="7">
-                                            <p:txEl>
-                                              <p:pRg st="9" end="9"/>
-                                            </p:txEl>
-                                          </p:spTgt>
-                                        </p:tgtEl>
-                                        <p:attrNameLst>
-                                          <p:attrName>style.visibility</p:attrName>
-                                        </p:attrNameLst>
-                                      </p:cBhvr>
-                                      <p:to>
-                                        <p:strVal val="visible"/>
-                                      </p:to>
-                                    </p:set>
-                                    <p:animEffect transition="in" filter="fade">
-                                      <p:cBhvr>
-                                        <p:cTn id="34" dur="500"/>
-                                        <p:tgtEl>
-                                          <p:spTgt spid="7">
-                                            <p:txEl>
-                                              <p:pRg st="9" end="9"/>
-                                            </p:txEl>
-                                          </p:spTgt>
-                                        </p:tgtEl>
-                                      </p:cBhvr>
-                                    </p:animEffect>
-                                  </p:childTnLst>
-                                </p:cTn>
-                              </p:par>
-                            </p:childTnLst>
-                          </p:cTn>
-                        </p:par>
-                      </p:childTnLst>
-                    </p:cTn>
-                  </p:par>
-                </p:childTnLst>
-              </p:cTn>
-              <p:prevCondLst>
-                <p:cond evt="onPrev" delay="0">
-                  <p:tgtEl>
-                    <p:sldTgt/>
-                  </p:tgtEl>
-                </p:cond>
-              </p:prevCondLst>
-              <p:nextCondLst>
-                <p:cond evt="onNext" delay="0">
-                  <p:tgtEl>
-                    <p:sldTgt/>
-                  </p:tgtEl>
-                </p:cond>
-              </p:nextCondLst>
-            </p:seq>
-          </p:childTnLst>
-        </p:cTn>
-      </p:par>
-    </p:tnLst>
-  </p:timing>
-</p:sld>
-</file>
-
-<file path=ppt/slides/slide12.xml><?xml version="1.0" encoding="utf-8"?>
-<p:sld xmlns:a="http://schemas.openxmlformats.org/drawingml/2006/main" xmlns:r="http://schemas.openxmlformats.org/officeDocument/2006/relationships" xmlns:p="http://schemas.openxmlformats.org/presentationml/2006/main">
-  <p:cSld>
-    <p:spTree>
-      <p:nvGrpSpPr>
-        <p:cNvPr id="1" name=""/>
-        <p:cNvGrpSpPr/>
-        <p:nvPr/>
-      </p:nvGrpSpPr>
-      <p:grpSpPr>
-        <a:xfrm>
-          <a:off x="0" y="0"/>
-          <a:ext cx="0" cy="0"/>
-          <a:chOff x="0" y="0"/>
-          <a:chExt cx="0" cy="0"/>
-        </a:xfrm>
-      </p:grpSpPr>
-      <p:sp>
-        <p:nvSpPr>
-          <p:cNvPr id="4" name="Title 1"/>
-          <p:cNvSpPr>
-            <a:spLocks noGrp="1"/>
-          </p:cNvSpPr>
-          <p:nvPr>
-            <p:ph type="title"/>
-          </p:nvPr>
-        </p:nvSpPr>
-        <p:spPr>
-          <a:xfrm>
-            <a:off x="1752600" y="282575"/>
-            <a:ext cx="7086600" cy="944563"/>
-          </a:xfrm>
-        </p:spPr>
-        <p:txBody>
-          <a:bodyPr/>
-          <a:lstStyle/>
-          <a:p>
-            <a:pPr algn="ctr"/>
-            <a:r>
-              <a:rPr lang="en-US"/>
-              <a:t>Hạn chế</a:t>
-            </a:r>
-          </a:p>
-        </p:txBody>
-      </p:sp>
-      <p:sp>
-        <p:nvSpPr>
-          <p:cNvPr id="5" name="Content Placeholder 4"/>
-          <p:cNvSpPr>
-            <a:spLocks noGrp="1"/>
-          </p:cNvSpPr>
-          <p:nvPr>
-            <p:ph idx="1"/>
-          </p:nvPr>
-        </p:nvSpPr>
-        <p:spPr>
-          <a:xfrm>
-            <a:off x="609600" y="1633538"/>
-            <a:ext cx="8229600" cy="4691062"/>
-          </a:xfrm>
-        </p:spPr>
-        <p:txBody>
-          <a:bodyPr/>
-          <a:lstStyle/>
-          <a:p>
-            <a:pPr>
-              <a:buFont typeface="Wingdings" panose="05000000000000000000" pitchFamily="2" charset="2"/>
-              <a:buChar char="v"/>
-            </a:pPr>
-            <a:r>
-              <a:rPr lang="en-US"/>
-              <a:t>HẠN CHẾ</a:t>
-            </a:r>
-          </a:p>
-          <a:p>
-            <a:pPr>
-              <a:buFont typeface="Arial" panose="020B0604020202020204" pitchFamily="34" charset="0"/>
-              <a:buChar char="•"/>
-            </a:pPr>
-            <a:r>
-              <a:rPr lang="en-US" sz="2400"/>
-              <a:t>Thực hiện qua nhiều bước</a:t>
-            </a:r>
-          </a:p>
-          <a:p>
-            <a:pPr>
-              <a:buFont typeface="Arial" panose="020B0604020202020204" pitchFamily="34" charset="0"/>
-              <a:buChar char="•"/>
-            </a:pPr>
-            <a:r>
-              <a:rPr lang="en-US" sz="2400"/>
-              <a:t>Nhiều thao tác phức tạp</a:t>
-            </a:r>
-          </a:p>
-          <a:p>
-            <a:pPr>
-              <a:buFont typeface="Arial" panose="020B0604020202020204" pitchFamily="34" charset="0"/>
-              <a:buChar char="•"/>
-            </a:pPr>
-            <a:r>
-              <a:rPr lang="en-US" sz="2400"/>
-              <a:t>Thao tác nhập thủ công có thể còn sai sót</a:t>
-            </a:r>
-          </a:p>
-          <a:p>
-            <a:pPr>
-              <a:buFont typeface="Arial" panose="020B0604020202020204" pitchFamily="34" charset="0"/>
-              <a:buChar char="•"/>
-            </a:pPr>
-            <a:r>
-              <a:rPr lang="en-US" sz="2400"/>
-              <a:t>Cơ sở dữ liệu chưa chính xác</a:t>
-            </a:r>
-          </a:p>
-          <a:p>
-            <a:pPr>
-              <a:buFont typeface="Arial" panose="020B0604020202020204" pitchFamily="34" charset="0"/>
-              <a:buChar char="•"/>
-            </a:pPr>
-            <a:r>
-              <a:rPr lang="en-US" sz="2400"/>
-              <a:t>Host hạn chế băng thông, tốc độ (miễn phí)</a:t>
-            </a:r>
-          </a:p>
-        </p:txBody>
-      </p:sp>
-      <p:sp>
-        <p:nvSpPr>
-          <p:cNvPr id="2" name="Slide Number Placeholder 1"/>
-          <p:cNvSpPr>
-            <a:spLocks noGrp="1"/>
-          </p:cNvSpPr>
-          <p:nvPr>
-            <p:ph type="sldNum" sz="quarter" idx="12"/>
-          </p:nvPr>
-        </p:nvSpPr>
-        <p:spPr/>
-        <p:txBody>
-          <a:bodyPr/>
-          <a:lstStyle/>
-          <a:p>
-            <a:pPr>
-              <a:defRPr/>
-            </a:pPr>
-            <a:fld id="{20CDDA0F-6228-4D21-A34F-D991946E76B9}" type="slidenum">
-              <a:rPr lang="en-US" altLang="en-US" smtClean="0"/>
-              <a:pPr>
-                <a:defRPr/>
-              </a:pPr>
-              <a:t>12</a:t>
-            </a:fld>
-            <a:endParaRPr lang="en-US" altLang="en-US"/>
-          </a:p>
-        </p:txBody>
-      </p:sp>
-    </p:spTree>
-    <p:extLst>
-      <p:ext uri="{BB962C8B-B14F-4D97-AF65-F5344CB8AC3E}">
-        <p14:creationId xmlns:p14="http://schemas.microsoft.com/office/powerpoint/2010/main" val="3554008799"/>
-      </p:ext>
-    </p:extLst>
-  </p:cSld>
-  <p:clrMapOvr>
-    <a:masterClrMapping/>
-  </p:clrMapOvr>
-  <p:timing>
-    <p:tnLst>
-      <p:par>
-        <p:cTn id="1" dur="indefinite" restart="never" nodeType="tmRoot">
-          <p:childTnLst>
-            <p:seq concurrent="1" nextAc="seek">
-              <p:cTn id="2" dur="indefinite" nodeType="mainSeq">
-                <p:childTnLst>
-                  <p:par>
-                    <p:cTn id="3" fill="hold">
-                      <p:stCondLst>
-                        <p:cond delay="indefinite"/>
-                        <p:cond evt="onBegin" delay="0">
-                          <p:tn val="2"/>
-                        </p:cond>
-                      </p:stCondLst>
-                      <p:childTnLst>
-                        <p:par>
-                          <p:cTn id="4" fill="hold">
-                            <p:stCondLst>
-                              <p:cond delay="0"/>
-                            </p:stCondLst>
-                            <p:childTnLst>
-                              <p:par>
-                                <p:cTn id="5" presetID="2" presetClass="entr" presetSubtype="1" fill="hold" nodeType="withEffect">
-                                  <p:stCondLst>
-                                    <p:cond delay="0"/>
-                                  </p:stCondLst>
-                                  <p:childTnLst>
-                                    <p:set>
-                                      <p:cBhvr>
-                                        <p:cTn id="6" dur="1" fill="hold">
-                                          <p:stCondLst>
-                                            <p:cond delay="0"/>
-                                          </p:stCondLst>
-                                        </p:cTn>
-                                        <p:tgtEl>
-                                          <p:spTgt spid="5">
-                                            <p:txEl>
-                                              <p:pRg st="0" end="0"/>
-                                            </p:txEl>
-                                          </p:spTgt>
-                                        </p:tgtEl>
-                                        <p:attrNameLst>
-                                          <p:attrName>style.visibility</p:attrName>
-                                        </p:attrNameLst>
-                                      </p:cBhvr>
-                                      <p:to>
-                                        <p:strVal val="visible"/>
-                                      </p:to>
-                                    </p:set>
-                                    <p:anim calcmode="lin" valueType="num">
-                                      <p:cBhvr additive="base">
-                                        <p:cTn id="7" dur="500" fill="hold"/>
-                                        <p:tgtEl>
-                                          <p:spTgt spid="5">
-                                            <p:txEl>
-                                              <p:pRg st="0" end="0"/>
-                                            </p:txEl>
-                                          </p:spTgt>
-                                        </p:tgtEl>
-                                        <p:attrNameLst>
-                                          <p:attrName>ppt_x</p:attrName>
-                                        </p:attrNameLst>
-                                      </p:cBhvr>
-                                      <p:tavLst>
-                                        <p:tav tm="0">
-                                          <p:val>
-                                            <p:strVal val="#ppt_x"/>
-                                          </p:val>
-                                        </p:tav>
-                                        <p:tav tm="100000">
-                                          <p:val>
-                                            <p:strVal val="#ppt_x"/>
-                                          </p:val>
-                                        </p:tav>
-                                      </p:tavLst>
-                                    </p:anim>
-                                    <p:anim calcmode="lin" valueType="num">
-                                      <p:cBhvr additive="base">
-                                        <p:cTn id="8" dur="500" fill="hold"/>
-                                        <p:tgtEl>
-                                          <p:spTgt spid="5">
-                                            <p:txEl>
-                                              <p:pRg st="0" end="0"/>
-                                            </p:txEl>
-                                          </p:spTgt>
-                                        </p:tgtEl>
-                                        <p:attrNameLst>
-                                          <p:attrName>ppt_y</p:attrName>
-                                        </p:attrNameLst>
-                                      </p:cBhvr>
-                                      <p:tavLst>
-                                        <p:tav tm="0">
-                                          <p:val>
-                                            <p:strVal val="0-#ppt_h/2"/>
-                                          </p:val>
-                                        </p:tav>
-                                        <p:tav tm="100000">
-                                          <p:val>
-                                            <p:strVal val="#ppt_y"/>
-                                          </p:val>
-                                        </p:tav>
-                                      </p:tavLst>
-                                    </p:anim>
-                                  </p:childTnLst>
-                                </p:cTn>
-                              </p:par>
-                              <p:par>
-                                <p:cTn id="9" presetID="2" presetClass="entr" presetSubtype="1" fill="hold" nodeType="withEffect">
-                                  <p:stCondLst>
-                                    <p:cond delay="0"/>
-                                  </p:stCondLst>
-                                  <p:childTnLst>
-                                    <p:set>
-                                      <p:cBhvr>
-                                        <p:cTn id="10" dur="1" fill="hold">
-                                          <p:stCondLst>
-                                            <p:cond delay="0"/>
-                                          </p:stCondLst>
-                                        </p:cTn>
-                                        <p:tgtEl>
-                                          <p:spTgt spid="5">
-                                            <p:txEl>
-                                              <p:pRg st="1" end="1"/>
-                                            </p:txEl>
-                                          </p:spTgt>
-                                        </p:tgtEl>
-                                        <p:attrNameLst>
-                                          <p:attrName>style.visibility</p:attrName>
-                                        </p:attrNameLst>
-                                      </p:cBhvr>
-                                      <p:to>
-                                        <p:strVal val="visible"/>
-                                      </p:to>
-                                    </p:set>
-                                    <p:anim calcmode="lin" valueType="num">
-                                      <p:cBhvr additive="base">
-                                        <p:cTn id="11" dur="500" fill="hold"/>
-                                        <p:tgtEl>
-                                          <p:spTgt spid="5">
-                                            <p:txEl>
-                                              <p:pRg st="1" end="1"/>
-                                            </p:txEl>
-                                          </p:spTgt>
-                                        </p:tgtEl>
-                                        <p:attrNameLst>
-                                          <p:attrName>ppt_x</p:attrName>
-                                        </p:attrNameLst>
-                                      </p:cBhvr>
-                                      <p:tavLst>
-                                        <p:tav tm="0">
-                                          <p:val>
-                                            <p:strVal val="#ppt_x"/>
-                                          </p:val>
-                                        </p:tav>
-                                        <p:tav tm="100000">
-                                          <p:val>
-                                            <p:strVal val="#ppt_x"/>
-                                          </p:val>
-                                        </p:tav>
-                                      </p:tavLst>
-                                    </p:anim>
-                                    <p:anim calcmode="lin" valueType="num">
-                                      <p:cBhvr additive="base">
-                                        <p:cTn id="12" dur="500" fill="hold"/>
-                                        <p:tgtEl>
-                                          <p:spTgt spid="5">
-                                            <p:txEl>
-                                              <p:pRg st="1" end="1"/>
-                                            </p:txEl>
-                                          </p:spTgt>
-                                        </p:tgtEl>
-                                        <p:attrNameLst>
-                                          <p:attrName>ppt_y</p:attrName>
-                                        </p:attrNameLst>
-                                      </p:cBhvr>
-                                      <p:tavLst>
-                                        <p:tav tm="0">
-                                          <p:val>
-                                            <p:strVal val="0-#ppt_h/2"/>
-                                          </p:val>
-                                        </p:tav>
-                                        <p:tav tm="100000">
-                                          <p:val>
-                                            <p:strVal val="#ppt_y"/>
-                                          </p:val>
-                                        </p:tav>
-                                      </p:tavLst>
-                                    </p:anim>
-                                  </p:childTnLst>
-                                </p:cTn>
-                              </p:par>
-                              <p:par>
-                                <p:cTn id="13" presetID="2" presetClass="entr" presetSubtype="1" fill="hold" nodeType="withEffect">
-                                  <p:stCondLst>
-                                    <p:cond delay="0"/>
-                                  </p:stCondLst>
-                                  <p:childTnLst>
-                                    <p:set>
-                                      <p:cBhvr>
-                                        <p:cTn id="14" dur="1" fill="hold">
-                                          <p:stCondLst>
-                                            <p:cond delay="0"/>
-                                          </p:stCondLst>
-                                        </p:cTn>
-                                        <p:tgtEl>
-                                          <p:spTgt spid="5">
-                                            <p:txEl>
-                                              <p:pRg st="2" end="2"/>
-                                            </p:txEl>
-                                          </p:spTgt>
-                                        </p:tgtEl>
-                                        <p:attrNameLst>
-                                          <p:attrName>style.visibility</p:attrName>
-                                        </p:attrNameLst>
-                                      </p:cBhvr>
-                                      <p:to>
-                                        <p:strVal val="visible"/>
-                                      </p:to>
-                                    </p:set>
-                                    <p:anim calcmode="lin" valueType="num">
-                                      <p:cBhvr additive="base">
-                                        <p:cTn id="15" dur="500" fill="hold"/>
-                                        <p:tgtEl>
-                                          <p:spTgt spid="5">
-                                            <p:txEl>
-                                              <p:pRg st="2" end="2"/>
-                                            </p:txEl>
-                                          </p:spTgt>
-                                        </p:tgtEl>
-                                        <p:attrNameLst>
-                                          <p:attrName>ppt_x</p:attrName>
-                                        </p:attrNameLst>
-                                      </p:cBhvr>
-                                      <p:tavLst>
-                                        <p:tav tm="0">
-                                          <p:val>
-                                            <p:strVal val="#ppt_x"/>
-                                          </p:val>
-                                        </p:tav>
-                                        <p:tav tm="100000">
-                                          <p:val>
-                                            <p:strVal val="#ppt_x"/>
-                                          </p:val>
-                                        </p:tav>
-                                      </p:tavLst>
-                                    </p:anim>
-                                    <p:anim calcmode="lin" valueType="num">
-                                      <p:cBhvr additive="base">
-                                        <p:cTn id="16" dur="500" fill="hold"/>
-                                        <p:tgtEl>
-                                          <p:spTgt spid="5">
-                                            <p:txEl>
-                                              <p:pRg st="2" end="2"/>
-                                            </p:txEl>
-                                          </p:spTgt>
-                                        </p:tgtEl>
-                                        <p:attrNameLst>
-                                          <p:attrName>ppt_y</p:attrName>
-                                        </p:attrNameLst>
-                                      </p:cBhvr>
-                                      <p:tavLst>
-                                        <p:tav tm="0">
-                                          <p:val>
-                                            <p:strVal val="0-#ppt_h/2"/>
-                                          </p:val>
-                                        </p:tav>
-                                        <p:tav tm="100000">
-                                          <p:val>
-                                            <p:strVal val="#ppt_y"/>
-                                          </p:val>
-                                        </p:tav>
-                                      </p:tavLst>
-                                    </p:anim>
-                                  </p:childTnLst>
-                                </p:cTn>
-                              </p:par>
-                              <p:par>
-                                <p:cTn id="17" presetID="2" presetClass="entr" presetSubtype="1" fill="hold" nodeType="withEffect">
-                                  <p:stCondLst>
-                                    <p:cond delay="0"/>
-                                  </p:stCondLst>
-                                  <p:childTnLst>
-                                    <p:set>
-                                      <p:cBhvr>
-                                        <p:cTn id="18" dur="1" fill="hold">
-                                          <p:stCondLst>
-                                            <p:cond delay="0"/>
-                                          </p:stCondLst>
-                                        </p:cTn>
-                                        <p:tgtEl>
-                                          <p:spTgt spid="5">
-                                            <p:txEl>
-                                              <p:pRg st="3" end="3"/>
-                                            </p:txEl>
-                                          </p:spTgt>
-                                        </p:tgtEl>
-                                        <p:attrNameLst>
-                                          <p:attrName>style.visibility</p:attrName>
-                                        </p:attrNameLst>
-                                      </p:cBhvr>
-                                      <p:to>
-                                        <p:strVal val="visible"/>
-                                      </p:to>
-                                    </p:set>
-                                    <p:anim calcmode="lin" valueType="num">
-                                      <p:cBhvr additive="base">
-                                        <p:cTn id="19" dur="500" fill="hold"/>
-                                        <p:tgtEl>
-                                          <p:spTgt spid="5">
-                                            <p:txEl>
-                                              <p:pRg st="3" end="3"/>
-                                            </p:txEl>
-                                          </p:spTgt>
-                                        </p:tgtEl>
-                                        <p:attrNameLst>
-                                          <p:attrName>ppt_x</p:attrName>
-                                        </p:attrNameLst>
-                                      </p:cBhvr>
-                                      <p:tavLst>
-                                        <p:tav tm="0">
-                                          <p:val>
-                                            <p:strVal val="#ppt_x"/>
-                                          </p:val>
-                                        </p:tav>
-                                        <p:tav tm="100000">
-                                          <p:val>
-                                            <p:strVal val="#ppt_x"/>
-                                          </p:val>
-                                        </p:tav>
-                                      </p:tavLst>
-                                    </p:anim>
-                                    <p:anim calcmode="lin" valueType="num">
-                                      <p:cBhvr additive="base">
-                                        <p:cTn id="20" dur="500" fill="hold"/>
-                                        <p:tgtEl>
-                                          <p:spTgt spid="5">
-                                            <p:txEl>
-                                              <p:pRg st="3" end="3"/>
-                                            </p:txEl>
-                                          </p:spTgt>
-                                        </p:tgtEl>
-                                        <p:attrNameLst>
-                                          <p:attrName>ppt_y</p:attrName>
-                                        </p:attrNameLst>
-                                      </p:cBhvr>
-                                      <p:tavLst>
-                                        <p:tav tm="0">
-                                          <p:val>
-                                            <p:strVal val="0-#ppt_h/2"/>
-                                          </p:val>
-                                        </p:tav>
-                                        <p:tav tm="100000">
-                                          <p:val>
-                                            <p:strVal val="#ppt_y"/>
-                                          </p:val>
-                                        </p:tav>
-                                      </p:tavLst>
-                                    </p:anim>
-                                  </p:childTnLst>
-                                </p:cTn>
-                              </p:par>
-                              <p:par>
-                                <p:cTn id="21" presetID="2" presetClass="entr" presetSubtype="1" fill="hold" nodeType="withEffect">
-                                  <p:stCondLst>
-                                    <p:cond delay="0"/>
-                                  </p:stCondLst>
-                                  <p:childTnLst>
-                                    <p:set>
-                                      <p:cBhvr>
-                                        <p:cTn id="22" dur="1" fill="hold">
-                                          <p:stCondLst>
-                                            <p:cond delay="0"/>
-                                          </p:stCondLst>
-                                        </p:cTn>
-                                        <p:tgtEl>
-                                          <p:spTgt spid="5">
-                                            <p:txEl>
-                                              <p:pRg st="4" end="4"/>
-                                            </p:txEl>
-                                          </p:spTgt>
-                                        </p:tgtEl>
-                                        <p:attrNameLst>
-                                          <p:attrName>style.visibility</p:attrName>
-                                        </p:attrNameLst>
-                                      </p:cBhvr>
-                                      <p:to>
-                                        <p:strVal val="visible"/>
-                                      </p:to>
-                                    </p:set>
-                                    <p:anim calcmode="lin" valueType="num">
-                                      <p:cBhvr additive="base">
-                                        <p:cTn id="23" dur="500" fill="hold"/>
-                                        <p:tgtEl>
-                                          <p:spTgt spid="5">
-                                            <p:txEl>
-                                              <p:pRg st="4" end="4"/>
-                                            </p:txEl>
-                                          </p:spTgt>
-                                        </p:tgtEl>
-                                        <p:attrNameLst>
-                                          <p:attrName>ppt_x</p:attrName>
-                                        </p:attrNameLst>
-                                      </p:cBhvr>
-                                      <p:tavLst>
-                                        <p:tav tm="0">
-                                          <p:val>
-                                            <p:strVal val="#ppt_x"/>
-                                          </p:val>
-                                        </p:tav>
-                                        <p:tav tm="100000">
-                                          <p:val>
-                                            <p:strVal val="#ppt_x"/>
-                                          </p:val>
-                                        </p:tav>
-                                      </p:tavLst>
-                                    </p:anim>
-                                    <p:anim calcmode="lin" valueType="num">
-                                      <p:cBhvr additive="base">
-                                        <p:cTn id="24" dur="500" fill="hold"/>
-                                        <p:tgtEl>
-                                          <p:spTgt spid="5">
-                                            <p:txEl>
-                                              <p:pRg st="4" end="4"/>
-                                            </p:txEl>
-                                          </p:spTgt>
-                                        </p:tgtEl>
-                                        <p:attrNameLst>
-                                          <p:attrName>ppt_y</p:attrName>
-                                        </p:attrNameLst>
-                                      </p:cBhvr>
-                                      <p:tavLst>
-                                        <p:tav tm="0">
-                                          <p:val>
-                                            <p:strVal val="0-#ppt_h/2"/>
-                                          </p:val>
-                                        </p:tav>
-                                        <p:tav tm="100000">
-                                          <p:val>
-                                            <p:strVal val="#ppt_y"/>
-                                          </p:val>
-                                        </p:tav>
-                                      </p:tavLst>
-                                    </p:anim>
-                                  </p:childTnLst>
-                                </p:cTn>
-                              </p:par>
-                              <p:par>
-                                <p:cTn id="25" presetID="2" presetClass="entr" presetSubtype="1" fill="hold" nodeType="withEffect">
-                                  <p:stCondLst>
-                                    <p:cond delay="0"/>
-                                  </p:stCondLst>
-                                  <p:childTnLst>
-                                    <p:set>
-                                      <p:cBhvr>
-                                        <p:cTn id="26" dur="1" fill="hold">
-                                          <p:stCondLst>
-                                            <p:cond delay="0"/>
-                                          </p:stCondLst>
-                                        </p:cTn>
-                                        <p:tgtEl>
-                                          <p:spTgt spid="5">
-                                            <p:txEl>
-                                              <p:pRg st="5" end="5"/>
-                                            </p:txEl>
-                                          </p:spTgt>
-                                        </p:tgtEl>
-                                        <p:attrNameLst>
-                                          <p:attrName>style.visibility</p:attrName>
-                                        </p:attrNameLst>
-                                      </p:cBhvr>
-                                      <p:to>
-                                        <p:strVal val="visible"/>
-                                      </p:to>
-                                    </p:set>
-                                    <p:anim calcmode="lin" valueType="num">
-                                      <p:cBhvr additive="base">
-                                        <p:cTn id="27" dur="500" fill="hold"/>
-                                        <p:tgtEl>
-                                          <p:spTgt spid="5">
-                                            <p:txEl>
-                                              <p:pRg st="5" end="5"/>
-                                            </p:txEl>
-                                          </p:spTgt>
-                                        </p:tgtEl>
-                                        <p:attrNameLst>
-                                          <p:attrName>ppt_x</p:attrName>
-                                        </p:attrNameLst>
-                                      </p:cBhvr>
-                                      <p:tavLst>
-                                        <p:tav tm="0">
-                                          <p:val>
-                                            <p:strVal val="#ppt_x"/>
-                                          </p:val>
-                                        </p:tav>
-                                        <p:tav tm="100000">
-                                          <p:val>
-                                            <p:strVal val="#ppt_x"/>
-                                          </p:val>
-                                        </p:tav>
-                                      </p:tavLst>
-                                    </p:anim>
-                                    <p:anim calcmode="lin" valueType="num">
-                                      <p:cBhvr additive="base">
-                                        <p:cTn id="28" dur="500" fill="hold"/>
-                                        <p:tgtEl>
-                                          <p:spTgt spid="5">
-                                            <p:txEl>
-                                              <p:pRg st="5" end="5"/>
-                                            </p:txEl>
-                                          </p:spTgt>
-                                        </p:tgtEl>
-                                        <p:attrNameLst>
-                                          <p:attrName>ppt_y</p:attrName>
-                                        </p:attrNameLst>
-                                      </p:cBhvr>
-                                      <p:tavLst>
-                                        <p:tav tm="0">
-                                          <p:val>
-                                            <p:strVal val="0-#ppt_h/2"/>
-                                          </p:val>
-                                        </p:tav>
-                                        <p:tav tm="100000">
-                                          <p:val>
-                                            <p:strVal val="#ppt_y"/>
-                                          </p:val>
-                                        </p:tav>
-                                      </p:tavLst>
-                                    </p:anim>
-                                  </p:childTnLst>
-                                </p:cTn>
-                              </p:par>
                             </p:childTnLst>
                           </p:cTn>
                         </p:par>
@@ -7087,7 +6308,7 @@
       </p:grpSpPr>
       <p:sp>
         <p:nvSpPr>
-          <p:cNvPr id="5" name="Title 1"/>
+          <p:cNvPr id="4" name="Title 1"/>
           <p:cNvSpPr>
             <a:spLocks noGrp="1"/>
           </p:cNvSpPr>
@@ -7108,86 +6329,8 @@
             <a:pPr algn="ctr"/>
             <a:r>
               <a:rPr lang="en-US"/>
-              <a:t>Hướng phát triển</a:t>
-            </a:r>
-          </a:p>
-        </p:txBody>
-      </p:sp>
-      <p:sp>
-        <p:nvSpPr>
-          <p:cNvPr id="6" name="Content Placeholder 4"/>
-          <p:cNvSpPr>
-            <a:spLocks noGrp="1"/>
-          </p:cNvSpPr>
-          <p:nvPr>
-            <p:ph idx="1"/>
-          </p:nvPr>
-        </p:nvSpPr>
-        <p:spPr>
-          <a:xfrm>
-            <a:off x="609600" y="1633538"/>
-            <a:ext cx="8229600" cy="4691062"/>
-          </a:xfrm>
-        </p:spPr>
-        <p:txBody>
-          <a:bodyPr/>
-          <a:lstStyle/>
-          <a:p>
-            <a:pPr>
-              <a:buFont typeface="Wingdings" panose="05000000000000000000" pitchFamily="2" charset="2"/>
-              <a:buChar char="v"/>
-            </a:pPr>
-            <a:r>
-              <a:rPr lang="en-US"/>
-              <a:t>HƯỚNG PHÁT TRIỂN</a:t>
-            </a:r>
-          </a:p>
-          <a:p>
-            <a:pPr>
-              <a:buFont typeface="Arial" panose="020B0604020202020204" pitchFamily="34" charset="0"/>
-              <a:buChar char="•"/>
-            </a:pPr>
-            <a:r>
-              <a:rPr lang="en-US" sz="2400"/>
-              <a:t>Sử dụng công nghệ Bootstrap lên trang nhân viên</a:t>
-            </a:r>
-          </a:p>
-          <a:p>
-            <a:pPr>
-              <a:buFont typeface="Arial" panose="020B0604020202020204" pitchFamily="34" charset="0"/>
-              <a:buChar char="•"/>
-            </a:pPr>
-            <a:r>
-              <a:rPr lang="en-US" sz="2400"/>
-              <a:t>Xây dựng chức năng import thông tin từ dữ liệu có sẵn (excel, sql…)</a:t>
-            </a:r>
-          </a:p>
-          <a:p>
-            <a:pPr>
-              <a:buFont typeface="Arial" panose="020B0604020202020204" pitchFamily="34" charset="0"/>
-              <a:buChar char="•"/>
-            </a:pPr>
-            <a:r>
-              <a:rPr lang="en-US" sz="2400"/>
-              <a:t>Tìm hiểu thực tế hoạt động của ngân hang</a:t>
-            </a:r>
-          </a:p>
-          <a:p>
-            <a:pPr>
-              <a:buFont typeface="Arial" panose="020B0604020202020204" pitchFamily="34" charset="0"/>
-              <a:buChar char="•"/>
-            </a:pPr>
-            <a:r>
-              <a:rPr lang="en-US" sz="2400"/>
-              <a:t>Sử dụng các gói host cải thiện chất lượng, khắc phục các lỗi server</a:t>
-            </a:r>
-          </a:p>
-          <a:p>
-            <a:pPr>
-              <a:buFont typeface="Arial" panose="020B0604020202020204" pitchFamily="34" charset="0"/>
-              <a:buChar char="•"/>
-            </a:pPr>
-            <a:endParaRPr lang="en-US" sz="2400"/>
+              <a:t>Hạn chế</a:t>
+            </a:r>
           </a:p>
         </p:txBody>
       </p:sp>
@@ -7220,10 +6363,55 @@
           </a:p>
         </p:txBody>
       </p:sp>
+      <p:sp>
+        <p:nvSpPr>
+          <p:cNvPr id="8" name="Content Placeholder 6">
+            <a:extLst>
+              <a:ext uri="{FF2B5EF4-FFF2-40B4-BE49-F238E27FC236}">
+                <a16:creationId xmlns:a16="http://schemas.microsoft.com/office/drawing/2014/main" id="{5291E986-4A58-4D15-9611-FAB609E5AF95}"/>
+              </a:ext>
+            </a:extLst>
+          </p:cNvPr>
+          <p:cNvSpPr>
+            <a:spLocks noGrp="1"/>
+          </p:cNvSpPr>
+          <p:nvPr>
+            <p:ph idx="1"/>
+          </p:nvPr>
+        </p:nvSpPr>
+        <p:spPr>
+          <a:xfrm>
+            <a:off x="574431" y="1633538"/>
+            <a:ext cx="8229600" cy="4691062"/>
+          </a:xfrm>
+        </p:spPr>
+        <p:txBody>
+          <a:bodyPr/>
+          <a:lstStyle/>
+          <a:p>
+            <a:r>
+              <a:rPr lang="en-US" sz="2000"/>
+              <a:t>Các chức năng import, export excel và gửi mail xác thực thực thi còn chậm.</a:t>
+            </a:r>
+          </a:p>
+          <a:p>
+            <a:r>
+              <a:rPr lang="en-US" sz="2000"/>
+              <a:t>Chưa có chức năng quản lý các dữ liệu chi tiết như: khoa, bộ môn, chuyên ngành.</a:t>
+            </a:r>
+          </a:p>
+          <a:p>
+            <a:r>
+              <a:rPr lang="en-US" sz="2000"/>
+              <a:t>Giao diện di động tuy được tự căn chỉnh nhờ boostrap nhưng chưa đạt hiệu quả như thiết bị có kích thước lớn hơn.</a:t>
+            </a:r>
+          </a:p>
+        </p:txBody>
+      </p:sp>
     </p:spTree>
     <p:extLst>
       <p:ext uri="{BB962C8B-B14F-4D97-AF65-F5344CB8AC3E}">
-        <p14:creationId xmlns:p14="http://schemas.microsoft.com/office/powerpoint/2010/main" val="3130224592"/>
+        <p14:creationId xmlns:p14="http://schemas.microsoft.com/office/powerpoint/2010/main" val="3554008799"/>
       </p:ext>
     </p:extLst>
   </p:cSld>
@@ -7242,9 +6430,6 @@
                     <p:cTn id="3" fill="hold">
                       <p:stCondLst>
                         <p:cond delay="indefinite"/>
-                        <p:cond evt="onBegin" delay="0">
-                          <p:tn val="2"/>
-                        </p:cond>
                       </p:stCondLst>
                       <p:childTnLst>
                         <p:par>
@@ -7254,7 +6439,7 @@
                             </p:stCondLst>
                             <p:childTnLst>
                               <p:par>
-                                <p:cTn id="5" presetID="2" presetClass="entr" presetSubtype="1" fill="hold" nodeType="withEffect">
+                                <p:cTn id="5" presetID="10" presetClass="entr" presetSubtype="0" fill="hold" nodeType="clickEffect">
                                   <p:stCondLst>
                                     <p:cond delay="0"/>
                                   </p:stCondLst>
@@ -7267,7 +6452,7 @@
                                           </p:stCondLst>
                                         </p:cTn>
                                         <p:tgtEl>
-                                          <p:spTgt spid="6">
+                                          <p:spTgt spid="8">
                                             <p:txEl>
                                               <p:pRg st="0" end="0"/>
                                             </p:txEl>
@@ -7281,78 +6466,54 @@
                                         <p:strVal val="visible"/>
                                       </p:to>
                                     </p:set>
-                                    <p:anim calcmode="lin" valueType="num">
-                                      <p:cBhvr additive="base">
-                                        <p:cTn id="7" dur="500" fill="hold"/>
+                                    <p:animEffect transition="in" filter="fade">
+                                      <p:cBhvr>
+                                        <p:cTn id="7" dur="500"/>
                                         <p:tgtEl>
-                                          <p:spTgt spid="6">
+                                          <p:spTgt spid="8">
                                             <p:txEl>
                                               <p:pRg st="0" end="0"/>
                                             </p:txEl>
                                           </p:spTgt>
                                         </p:tgtEl>
-                                        <p:attrNameLst>
-                                          <p:attrName>ppt_x</p:attrName>
-                                        </p:attrNameLst>
                                       </p:cBhvr>
-                                      <p:tavLst>
-                                        <p:tav tm="0">
-                                          <p:val>
-                                            <p:strVal val="#ppt_x"/>
-                                          </p:val>
-                                        </p:tav>
-                                        <p:tav tm="100000">
-                                          <p:val>
-                                            <p:strVal val="#ppt_x"/>
-                                          </p:val>
-                                        </p:tav>
-                                      </p:tavLst>
-                                    </p:anim>
-                                    <p:anim calcmode="lin" valueType="num">
-                                      <p:cBhvr additive="base">
-                                        <p:cTn id="8" dur="500" fill="hold"/>
-                                        <p:tgtEl>
-                                          <p:spTgt spid="6">
-                                            <p:txEl>
-                                              <p:pRg st="0" end="0"/>
-                                            </p:txEl>
-                                          </p:spTgt>
-                                        </p:tgtEl>
-                                        <p:attrNameLst>
-                                          <p:attrName>ppt_y</p:attrName>
-                                        </p:attrNameLst>
-                                      </p:cBhvr>
-                                      <p:tavLst>
-                                        <p:tav tm="0">
-                                          <p:val>
-                                            <p:strVal val="0-#ppt_h/2"/>
-                                          </p:val>
-                                        </p:tav>
-                                        <p:tav tm="100000">
-                                          <p:val>
-                                            <p:strVal val="#ppt_y"/>
-                                          </p:val>
-                                        </p:tav>
-                                      </p:tavLst>
-                                    </p:anim>
+                                    </p:animEffect>
                                   </p:childTnLst>
                                 </p:cTn>
                               </p:par>
+                            </p:childTnLst>
+                          </p:cTn>
+                        </p:par>
+                      </p:childTnLst>
+                    </p:cTn>
+                  </p:par>
+                  <p:par>
+                    <p:cTn id="8" fill="hold">
+                      <p:stCondLst>
+                        <p:cond delay="indefinite"/>
+                      </p:stCondLst>
+                      <p:childTnLst>
+                        <p:par>
+                          <p:cTn id="9" fill="hold">
+                            <p:stCondLst>
+                              <p:cond delay="0"/>
+                            </p:stCondLst>
+                            <p:childTnLst>
                               <p:par>
-                                <p:cTn id="9" presetID="2" presetClass="entr" presetSubtype="1" fill="hold" nodeType="withEffect">
+                                <p:cTn id="10" presetID="10" presetClass="entr" presetSubtype="0" fill="hold" nodeType="clickEffect">
                                   <p:stCondLst>
                                     <p:cond delay="0"/>
                                   </p:stCondLst>
                                   <p:childTnLst>
                                     <p:set>
                                       <p:cBhvr>
-                                        <p:cTn id="10" dur="1" fill="hold">
+                                        <p:cTn id="11" dur="1" fill="hold">
                                           <p:stCondLst>
                                             <p:cond delay="0"/>
                                           </p:stCondLst>
                                         </p:cTn>
                                         <p:tgtEl>
-                                          <p:spTgt spid="6">
+                                          <p:spTgt spid="8">
                                             <p:txEl>
                                               <p:pRg st="1" end="1"/>
                                             </p:txEl>
@@ -7366,78 +6527,54 @@
                                         <p:strVal val="visible"/>
                                       </p:to>
                                     </p:set>
-                                    <p:anim calcmode="lin" valueType="num">
-                                      <p:cBhvr additive="base">
-                                        <p:cTn id="11" dur="500" fill="hold"/>
+                                    <p:animEffect transition="in" filter="fade">
+                                      <p:cBhvr>
+                                        <p:cTn id="12" dur="500"/>
                                         <p:tgtEl>
-                                          <p:spTgt spid="6">
+                                          <p:spTgt spid="8">
                                             <p:txEl>
                                               <p:pRg st="1" end="1"/>
                                             </p:txEl>
                                           </p:spTgt>
                                         </p:tgtEl>
-                                        <p:attrNameLst>
-                                          <p:attrName>ppt_x</p:attrName>
-                                        </p:attrNameLst>
                                       </p:cBhvr>
-                                      <p:tavLst>
-                                        <p:tav tm="0">
-                                          <p:val>
-                                            <p:strVal val="#ppt_x"/>
-                                          </p:val>
-                                        </p:tav>
-                                        <p:tav tm="100000">
-                                          <p:val>
-                                            <p:strVal val="#ppt_x"/>
-                                          </p:val>
-                                        </p:tav>
-                                      </p:tavLst>
-                                    </p:anim>
-                                    <p:anim calcmode="lin" valueType="num">
-                                      <p:cBhvr additive="base">
-                                        <p:cTn id="12" dur="500" fill="hold"/>
-                                        <p:tgtEl>
-                                          <p:spTgt spid="6">
-                                            <p:txEl>
-                                              <p:pRg st="1" end="1"/>
-                                            </p:txEl>
-                                          </p:spTgt>
-                                        </p:tgtEl>
-                                        <p:attrNameLst>
-                                          <p:attrName>ppt_y</p:attrName>
-                                        </p:attrNameLst>
-                                      </p:cBhvr>
-                                      <p:tavLst>
-                                        <p:tav tm="0">
-                                          <p:val>
-                                            <p:strVal val="0-#ppt_h/2"/>
-                                          </p:val>
-                                        </p:tav>
-                                        <p:tav tm="100000">
-                                          <p:val>
-                                            <p:strVal val="#ppt_y"/>
-                                          </p:val>
-                                        </p:tav>
-                                      </p:tavLst>
-                                    </p:anim>
+                                    </p:animEffect>
                                   </p:childTnLst>
                                 </p:cTn>
                               </p:par>
+                            </p:childTnLst>
+                          </p:cTn>
+                        </p:par>
+                      </p:childTnLst>
+                    </p:cTn>
+                  </p:par>
+                  <p:par>
+                    <p:cTn id="13" fill="hold">
+                      <p:stCondLst>
+                        <p:cond delay="indefinite"/>
+                      </p:stCondLst>
+                      <p:childTnLst>
+                        <p:par>
+                          <p:cTn id="14" fill="hold">
+                            <p:stCondLst>
+                              <p:cond delay="0"/>
+                            </p:stCondLst>
+                            <p:childTnLst>
                               <p:par>
-                                <p:cTn id="13" presetID="2" presetClass="entr" presetSubtype="1" fill="hold" nodeType="withEffect">
+                                <p:cTn id="15" presetID="10" presetClass="entr" presetSubtype="0" fill="hold" nodeType="clickEffect">
                                   <p:stCondLst>
                                     <p:cond delay="0"/>
                                   </p:stCondLst>
                                   <p:childTnLst>
                                     <p:set>
                                       <p:cBhvr>
-                                        <p:cTn id="14" dur="1" fill="hold">
+                                        <p:cTn id="16" dur="1" fill="hold">
                                           <p:stCondLst>
                                             <p:cond delay="0"/>
                                           </p:stCondLst>
                                         </p:cTn>
                                         <p:tgtEl>
-                                          <p:spTgt spid="6">
+                                          <p:spTgt spid="8">
                                             <p:txEl>
                                               <p:pRg st="2" end="2"/>
                                             </p:txEl>
@@ -7451,230 +6588,18 @@
                                         <p:strVal val="visible"/>
                                       </p:to>
                                     </p:set>
-                                    <p:anim calcmode="lin" valueType="num">
-                                      <p:cBhvr additive="base">
-                                        <p:cTn id="15" dur="500" fill="hold"/>
+                                    <p:animEffect transition="in" filter="fade">
+                                      <p:cBhvr>
+                                        <p:cTn id="17" dur="500"/>
                                         <p:tgtEl>
-                                          <p:spTgt spid="6">
+                                          <p:spTgt spid="8">
                                             <p:txEl>
                                               <p:pRg st="2" end="2"/>
                                             </p:txEl>
                                           </p:spTgt>
                                         </p:tgtEl>
-                                        <p:attrNameLst>
-                                          <p:attrName>ppt_x</p:attrName>
-                                        </p:attrNameLst>
                                       </p:cBhvr>
-                                      <p:tavLst>
-                                        <p:tav tm="0">
-                                          <p:val>
-                                            <p:strVal val="#ppt_x"/>
-                                          </p:val>
-                                        </p:tav>
-                                        <p:tav tm="100000">
-                                          <p:val>
-                                            <p:strVal val="#ppt_x"/>
-                                          </p:val>
-                                        </p:tav>
-                                      </p:tavLst>
-                                    </p:anim>
-                                    <p:anim calcmode="lin" valueType="num">
-                                      <p:cBhvr additive="base">
-                                        <p:cTn id="16" dur="500" fill="hold"/>
-                                        <p:tgtEl>
-                                          <p:spTgt spid="6">
-                                            <p:txEl>
-                                              <p:pRg st="2" end="2"/>
-                                            </p:txEl>
-                                          </p:spTgt>
-                                        </p:tgtEl>
-                                        <p:attrNameLst>
-                                          <p:attrName>ppt_y</p:attrName>
-                                        </p:attrNameLst>
-                                      </p:cBhvr>
-                                      <p:tavLst>
-                                        <p:tav tm="0">
-                                          <p:val>
-                                            <p:strVal val="0-#ppt_h/2"/>
-                                          </p:val>
-                                        </p:tav>
-                                        <p:tav tm="100000">
-                                          <p:val>
-                                            <p:strVal val="#ppt_y"/>
-                                          </p:val>
-                                        </p:tav>
-                                      </p:tavLst>
-                                    </p:anim>
-                                  </p:childTnLst>
-                                </p:cTn>
-                              </p:par>
-                              <p:par>
-                                <p:cTn id="17" presetID="2" presetClass="entr" presetSubtype="1" fill="hold" nodeType="withEffect">
-                                  <p:stCondLst>
-                                    <p:cond delay="0"/>
-                                  </p:stCondLst>
-                                  <p:childTnLst>
-                                    <p:set>
-                                      <p:cBhvr>
-                                        <p:cTn id="18" dur="1" fill="hold">
-                                          <p:stCondLst>
-                                            <p:cond delay="0"/>
-                                          </p:stCondLst>
-                                        </p:cTn>
-                                        <p:tgtEl>
-                                          <p:spTgt spid="6">
-                                            <p:txEl>
-                                              <p:pRg st="3" end="3"/>
-                                            </p:txEl>
-                                          </p:spTgt>
-                                        </p:tgtEl>
-                                        <p:attrNameLst>
-                                          <p:attrName>style.visibility</p:attrName>
-                                        </p:attrNameLst>
-                                      </p:cBhvr>
-                                      <p:to>
-                                        <p:strVal val="visible"/>
-                                      </p:to>
-                                    </p:set>
-                                    <p:anim calcmode="lin" valueType="num">
-                                      <p:cBhvr additive="base">
-                                        <p:cTn id="19" dur="500" fill="hold"/>
-                                        <p:tgtEl>
-                                          <p:spTgt spid="6">
-                                            <p:txEl>
-                                              <p:pRg st="3" end="3"/>
-                                            </p:txEl>
-                                          </p:spTgt>
-                                        </p:tgtEl>
-                                        <p:attrNameLst>
-                                          <p:attrName>ppt_x</p:attrName>
-                                        </p:attrNameLst>
-                                      </p:cBhvr>
-                                      <p:tavLst>
-                                        <p:tav tm="0">
-                                          <p:val>
-                                            <p:strVal val="#ppt_x"/>
-                                          </p:val>
-                                        </p:tav>
-                                        <p:tav tm="100000">
-                                          <p:val>
-                                            <p:strVal val="#ppt_x"/>
-                                          </p:val>
-                                        </p:tav>
-                                      </p:tavLst>
-                                    </p:anim>
-                                    <p:anim calcmode="lin" valueType="num">
-                                      <p:cBhvr additive="base">
-                                        <p:cTn id="20" dur="500" fill="hold"/>
-                                        <p:tgtEl>
-                                          <p:spTgt spid="6">
-                                            <p:txEl>
-                                              <p:pRg st="3" end="3"/>
-                                            </p:txEl>
-                                          </p:spTgt>
-                                        </p:tgtEl>
-                                        <p:attrNameLst>
-                                          <p:attrName>ppt_y</p:attrName>
-                                        </p:attrNameLst>
-                                      </p:cBhvr>
-                                      <p:tavLst>
-                                        <p:tav tm="0">
-                                          <p:val>
-                                            <p:strVal val="0-#ppt_h/2"/>
-                                          </p:val>
-                                        </p:tav>
-                                        <p:tav tm="100000">
-                                          <p:val>
-                                            <p:strVal val="#ppt_y"/>
-                                          </p:val>
-                                        </p:tav>
-                                      </p:tavLst>
-                                    </p:anim>
-                                  </p:childTnLst>
-                                </p:cTn>
-                              </p:par>
-                              <p:par>
-                                <p:cTn id="21" presetID="2" presetClass="entr" presetSubtype="1" fill="hold" nodeType="withEffect">
-                                  <p:stCondLst>
-                                    <p:cond delay="0"/>
-                                  </p:stCondLst>
-                                  <p:childTnLst>
-                                    <p:set>
-                                      <p:cBhvr>
-                                        <p:cTn id="22" dur="1" fill="hold">
-                                          <p:stCondLst>
-                                            <p:cond delay="0"/>
-                                          </p:stCondLst>
-                                        </p:cTn>
-                                        <p:tgtEl>
-                                          <p:spTgt spid="6">
-                                            <p:txEl>
-                                              <p:pRg st="4" end="4"/>
-                                            </p:txEl>
-                                          </p:spTgt>
-                                        </p:tgtEl>
-                                        <p:attrNameLst>
-                                          <p:attrName>style.visibility</p:attrName>
-                                        </p:attrNameLst>
-                                      </p:cBhvr>
-                                      <p:to>
-                                        <p:strVal val="visible"/>
-                                      </p:to>
-                                    </p:set>
-                                    <p:anim calcmode="lin" valueType="num">
-                                      <p:cBhvr additive="base">
-                                        <p:cTn id="23" dur="500" fill="hold"/>
-                                        <p:tgtEl>
-                                          <p:spTgt spid="6">
-                                            <p:txEl>
-                                              <p:pRg st="4" end="4"/>
-                                            </p:txEl>
-                                          </p:spTgt>
-                                        </p:tgtEl>
-                                        <p:attrNameLst>
-                                          <p:attrName>ppt_x</p:attrName>
-                                        </p:attrNameLst>
-                                      </p:cBhvr>
-                                      <p:tavLst>
-                                        <p:tav tm="0">
-                                          <p:val>
-                                            <p:strVal val="#ppt_x"/>
-                                          </p:val>
-                                        </p:tav>
-                                        <p:tav tm="100000">
-                                          <p:val>
-                                            <p:strVal val="#ppt_x"/>
-                                          </p:val>
-                                        </p:tav>
-                                      </p:tavLst>
-                                    </p:anim>
-                                    <p:anim calcmode="lin" valueType="num">
-                                      <p:cBhvr additive="base">
-                                        <p:cTn id="24" dur="500" fill="hold"/>
-                                        <p:tgtEl>
-                                          <p:spTgt spid="6">
-                                            <p:txEl>
-                                              <p:pRg st="4" end="4"/>
-                                            </p:txEl>
-                                          </p:spTgt>
-                                        </p:tgtEl>
-                                        <p:attrNameLst>
-                                          <p:attrName>ppt_y</p:attrName>
-                                        </p:attrNameLst>
-                                      </p:cBhvr>
-                                      <p:tavLst>
-                                        <p:tav tm="0">
-                                          <p:val>
-                                            <p:strVal val="0-#ppt_h/2"/>
-                                          </p:val>
-                                        </p:tav>
-                                        <p:tav tm="100000">
-                                          <p:val>
-                                            <p:strVal val="#ppt_y"/>
-                                          </p:val>
-                                        </p:tav>
-                                      </p:tavLst>
-                                    </p:anim>
+                                    </p:animEffect>
                                   </p:childTnLst>
                                 </p:cTn>
                               </p:par>
@@ -7710,6 +6635,355 @@
 </file>
 
 <file path=ppt/slides/slide14.xml><?xml version="1.0" encoding="utf-8"?>
+<p:sld xmlns:a="http://schemas.openxmlformats.org/drawingml/2006/main" xmlns:r="http://schemas.openxmlformats.org/officeDocument/2006/relationships" xmlns:p="http://schemas.openxmlformats.org/presentationml/2006/main">
+  <p:cSld>
+    <p:spTree>
+      <p:nvGrpSpPr>
+        <p:cNvPr id="1" name=""/>
+        <p:cNvGrpSpPr/>
+        <p:nvPr/>
+      </p:nvGrpSpPr>
+      <p:grpSpPr>
+        <a:xfrm>
+          <a:off x="0" y="0"/>
+          <a:ext cx="0" cy="0"/>
+          <a:chOff x="0" y="0"/>
+          <a:chExt cx="0" cy="0"/>
+        </a:xfrm>
+      </p:grpSpPr>
+      <p:sp>
+        <p:nvSpPr>
+          <p:cNvPr id="5" name="Title 1"/>
+          <p:cNvSpPr>
+            <a:spLocks noGrp="1"/>
+          </p:cNvSpPr>
+          <p:nvPr>
+            <p:ph type="title"/>
+          </p:nvPr>
+        </p:nvSpPr>
+        <p:spPr>
+          <a:xfrm>
+            <a:off x="1752600" y="282575"/>
+            <a:ext cx="7086600" cy="944563"/>
+          </a:xfrm>
+        </p:spPr>
+        <p:txBody>
+          <a:bodyPr/>
+          <a:lstStyle/>
+          <a:p>
+            <a:pPr algn="ctr"/>
+            <a:r>
+              <a:rPr lang="en-US"/>
+              <a:t>Hướng phát triển</a:t>
+            </a:r>
+          </a:p>
+        </p:txBody>
+      </p:sp>
+      <p:sp>
+        <p:nvSpPr>
+          <p:cNvPr id="2" name="Slide Number Placeholder 1"/>
+          <p:cNvSpPr>
+            <a:spLocks noGrp="1"/>
+          </p:cNvSpPr>
+          <p:nvPr>
+            <p:ph type="sldNum" sz="quarter" idx="12"/>
+          </p:nvPr>
+        </p:nvSpPr>
+        <p:spPr/>
+        <p:txBody>
+          <a:bodyPr/>
+          <a:lstStyle/>
+          <a:p>
+            <a:pPr>
+              <a:defRPr/>
+            </a:pPr>
+            <a:fld id="{20CDDA0F-6228-4D21-A34F-D991946E76B9}" type="slidenum">
+              <a:rPr lang="en-US" altLang="en-US" smtClean="0"/>
+              <a:pPr>
+                <a:defRPr/>
+              </a:pPr>
+              <a:t>14</a:t>
+            </a:fld>
+            <a:endParaRPr lang="en-US" altLang="en-US"/>
+          </a:p>
+        </p:txBody>
+      </p:sp>
+      <p:sp>
+        <p:nvSpPr>
+          <p:cNvPr id="7" name="Content Placeholder 6">
+            <a:extLst>
+              <a:ext uri="{FF2B5EF4-FFF2-40B4-BE49-F238E27FC236}">
+                <a16:creationId xmlns:a16="http://schemas.microsoft.com/office/drawing/2014/main" id="{69A4A251-2981-47E6-B3A1-D63F3BC2E704}"/>
+              </a:ext>
+            </a:extLst>
+          </p:cNvPr>
+          <p:cNvSpPr>
+            <a:spLocks noGrp="1"/>
+          </p:cNvSpPr>
+          <p:nvPr>
+            <p:ph idx="1"/>
+          </p:nvPr>
+        </p:nvSpPr>
+        <p:spPr>
+          <a:xfrm>
+            <a:off x="574431" y="1633538"/>
+            <a:ext cx="8229600" cy="4691062"/>
+          </a:xfrm>
+        </p:spPr>
+        <p:txBody>
+          <a:bodyPr/>
+          <a:lstStyle/>
+          <a:p>
+            <a:r>
+              <a:rPr lang="vi-VN" sz="2000"/>
+              <a:t>Cái thiện giao diện đáp ứng tốt hơn cho người dùng trên di động.</a:t>
+            </a:r>
+          </a:p>
+          <a:p>
+            <a:r>
+              <a:rPr lang="vi-VN" sz="2000"/>
+              <a:t>Tăng tốc xử lý và cải tiến các chức năng export, import excel và gửi mail xác thực.</a:t>
+            </a:r>
+          </a:p>
+          <a:p>
+            <a:r>
+              <a:rPr lang="vi-VN" sz="2000"/>
+              <a:t>Mở rộng quy mô hệ thống cho nhiều khoa khác, tạo các chức năng quản lý dữ liệu khoa, chuyên ngành, tổ bộ môn.</a:t>
+            </a:r>
+            <a:r>
+              <a:rPr lang="en-US" sz="2000"/>
+              <a:t>ả như thiết bị có kích thước lớn.</a:t>
+            </a:r>
+          </a:p>
+        </p:txBody>
+      </p:sp>
+    </p:spTree>
+    <p:extLst>
+      <p:ext uri="{BB962C8B-B14F-4D97-AF65-F5344CB8AC3E}">
+        <p14:creationId xmlns:p14="http://schemas.microsoft.com/office/powerpoint/2010/main" val="3130224592"/>
+      </p:ext>
+    </p:extLst>
+  </p:cSld>
+  <p:clrMapOvr>
+    <a:masterClrMapping/>
+  </p:clrMapOvr>
+  <p:timing>
+    <p:tnLst>
+      <p:par>
+        <p:cTn id="1" dur="indefinite" restart="never" nodeType="tmRoot">
+          <p:childTnLst>
+            <p:seq concurrent="1" nextAc="seek">
+              <p:cTn id="2" dur="indefinite" nodeType="mainSeq">
+                <p:childTnLst>
+                  <p:par>
+                    <p:cTn id="3" fill="hold">
+                      <p:stCondLst>
+                        <p:cond delay="indefinite"/>
+                      </p:stCondLst>
+                      <p:childTnLst>
+                        <p:par>
+                          <p:cTn id="4" fill="hold">
+                            <p:stCondLst>
+                              <p:cond delay="0"/>
+                            </p:stCondLst>
+                            <p:childTnLst>
+                              <p:par>
+                                <p:cTn id="5" presetID="10" presetClass="entr" presetSubtype="0" fill="hold" nodeType="clickEffect">
+                                  <p:stCondLst>
+                                    <p:cond delay="0"/>
+                                  </p:stCondLst>
+                                  <p:childTnLst>
+                                    <p:set>
+                                      <p:cBhvr>
+                                        <p:cTn id="6" dur="1" fill="hold">
+                                          <p:stCondLst>
+                                            <p:cond delay="0"/>
+                                          </p:stCondLst>
+                                        </p:cTn>
+                                        <p:tgtEl>
+                                          <p:spTgt spid="7">
+                                            <p:txEl>
+                                              <p:pRg st="0" end="0"/>
+                                            </p:txEl>
+                                          </p:spTgt>
+                                        </p:tgtEl>
+                                        <p:attrNameLst>
+                                          <p:attrName>style.visibility</p:attrName>
+                                        </p:attrNameLst>
+                                      </p:cBhvr>
+                                      <p:to>
+                                        <p:strVal val="visible"/>
+                                      </p:to>
+                                    </p:set>
+                                    <p:animEffect transition="in" filter="fade">
+                                      <p:cBhvr>
+                                        <p:cTn id="7" dur="500"/>
+                                        <p:tgtEl>
+                                          <p:spTgt spid="7">
+                                            <p:txEl>
+                                              <p:pRg st="0" end="0"/>
+                                            </p:txEl>
+                                          </p:spTgt>
+                                        </p:tgtEl>
+                                      </p:cBhvr>
+                                    </p:animEffect>
+                                  </p:childTnLst>
+                                </p:cTn>
+                              </p:par>
+                            </p:childTnLst>
+                          </p:cTn>
+                        </p:par>
+                      </p:childTnLst>
+                    </p:cTn>
+                  </p:par>
+                  <p:par>
+                    <p:cTn id="8" fill="hold">
+                      <p:stCondLst>
+                        <p:cond delay="indefinite"/>
+                      </p:stCondLst>
+                      <p:childTnLst>
+                        <p:par>
+                          <p:cTn id="9" fill="hold">
+                            <p:stCondLst>
+                              <p:cond delay="0"/>
+                            </p:stCondLst>
+                            <p:childTnLst>
+                              <p:par>
+                                <p:cTn id="10" presetID="10" presetClass="entr" presetSubtype="0" fill="hold" nodeType="clickEffect">
+                                  <p:stCondLst>
+                                    <p:cond delay="0"/>
+                                  </p:stCondLst>
+                                  <p:childTnLst>
+                                    <p:set>
+                                      <p:cBhvr>
+                                        <p:cTn id="11" dur="1" fill="hold">
+                                          <p:stCondLst>
+                                            <p:cond delay="0"/>
+                                          </p:stCondLst>
+                                        </p:cTn>
+                                        <p:tgtEl>
+                                          <p:spTgt spid="7">
+                                            <p:txEl>
+                                              <p:pRg st="1" end="1"/>
+                                            </p:txEl>
+                                          </p:spTgt>
+                                        </p:tgtEl>
+                                        <p:attrNameLst>
+                                          <p:attrName>style.visibility</p:attrName>
+                                        </p:attrNameLst>
+                                      </p:cBhvr>
+                                      <p:to>
+                                        <p:strVal val="visible"/>
+                                      </p:to>
+                                    </p:set>
+                                    <p:animEffect transition="in" filter="fade">
+                                      <p:cBhvr>
+                                        <p:cTn id="12" dur="500"/>
+                                        <p:tgtEl>
+                                          <p:spTgt spid="7">
+                                            <p:txEl>
+                                              <p:pRg st="1" end="1"/>
+                                            </p:txEl>
+                                          </p:spTgt>
+                                        </p:tgtEl>
+                                      </p:cBhvr>
+                                    </p:animEffect>
+                                  </p:childTnLst>
+                                </p:cTn>
+                              </p:par>
+                            </p:childTnLst>
+                          </p:cTn>
+                        </p:par>
+                      </p:childTnLst>
+                    </p:cTn>
+                  </p:par>
+                  <p:par>
+                    <p:cTn id="13" fill="hold">
+                      <p:stCondLst>
+                        <p:cond delay="indefinite"/>
+                      </p:stCondLst>
+                      <p:childTnLst>
+                        <p:par>
+                          <p:cTn id="14" fill="hold">
+                            <p:stCondLst>
+                              <p:cond delay="0"/>
+                            </p:stCondLst>
+                            <p:childTnLst>
+                              <p:par>
+                                <p:cTn id="15" presetID="10" presetClass="entr" presetSubtype="0" fill="hold" nodeType="clickEffect">
+                                  <p:stCondLst>
+                                    <p:cond delay="0"/>
+                                  </p:stCondLst>
+                                  <p:childTnLst>
+                                    <p:set>
+                                      <p:cBhvr>
+                                        <p:cTn id="16" dur="1" fill="hold">
+                                          <p:stCondLst>
+                                            <p:cond delay="0"/>
+                                          </p:stCondLst>
+                                        </p:cTn>
+                                        <p:tgtEl>
+                                          <p:spTgt spid="7">
+                                            <p:txEl>
+                                              <p:pRg st="2" end="2"/>
+                                            </p:txEl>
+                                          </p:spTgt>
+                                        </p:tgtEl>
+                                        <p:attrNameLst>
+                                          <p:attrName>style.visibility</p:attrName>
+                                        </p:attrNameLst>
+                                      </p:cBhvr>
+                                      <p:to>
+                                        <p:strVal val="visible"/>
+                                      </p:to>
+                                    </p:set>
+                                    <p:animEffect transition="in" filter="fade">
+                                      <p:cBhvr>
+                                        <p:cTn id="17" dur="500"/>
+                                        <p:tgtEl>
+                                          <p:spTgt spid="7">
+                                            <p:txEl>
+                                              <p:pRg st="2" end="2"/>
+                                            </p:txEl>
+                                          </p:spTgt>
+                                        </p:tgtEl>
+                                      </p:cBhvr>
+                                    </p:animEffect>
+                                  </p:childTnLst>
+                                </p:cTn>
+                              </p:par>
+                            </p:childTnLst>
+                          </p:cTn>
+                        </p:par>
+                      </p:childTnLst>
+                    </p:cTn>
+                  </p:par>
+                </p:childTnLst>
+              </p:cTn>
+              <p:prevCondLst>
+                <p:cond evt="onPrev" delay="0">
+                  <p:tgtEl>
+                    <p:sldTgt/>
+                  </p:tgtEl>
+                </p:cond>
+              </p:prevCondLst>
+              <p:nextCondLst>
+                <p:cond evt="onNext" delay="0">
+                  <p:tgtEl>
+                    <p:sldTgt/>
+                  </p:tgtEl>
+                </p:cond>
+              </p:nextCondLst>
+            </p:seq>
+          </p:childTnLst>
+        </p:cTn>
+      </p:par>
+    </p:tnLst>
+  </p:timing>
+</p:sld>
+</file>
+
+<file path=ppt/slides/slide15.xml><?xml version="1.0" encoding="utf-8"?>
 <p:sld xmlns:a="http://schemas.openxmlformats.org/drawingml/2006/main" xmlns:r="http://schemas.openxmlformats.org/officeDocument/2006/relationships" xmlns:p="http://schemas.openxmlformats.org/presentationml/2006/main" showMasterSp="0">
   <p:cSld>
     <p:bg>
@@ -8223,7 +7497,7 @@
 </p:sld>
 </file>
 
-<file path=ppt/slides/slide15.xml><?xml version="1.0" encoding="utf-8"?>
+<file path=ppt/slides/slide16.xml><?xml version="1.0" encoding="utf-8"?>
 <p:sld xmlns:a="http://schemas.openxmlformats.org/drawingml/2006/main" xmlns:r="http://schemas.openxmlformats.org/officeDocument/2006/relationships" xmlns:p="http://schemas.openxmlformats.org/presentationml/2006/main">
   <p:cSld>
     <p:spTree>
@@ -8436,7 +7710,7 @@
               <a:pPr>
                 <a:defRPr/>
               </a:pPr>
-              <a:t>15</a:t>
+              <a:t>16</a:t>
             </a:fld>
             <a:endParaRPr lang="en-US" altLang="en-US"/>
           </a:p>
@@ -11867,25 +11141,31 @@
           <a:p>
             <a:r>
               <a:rPr lang="en-US" sz="2000"/>
-              <a:t>Ghi nhận điểm danh, tính toán kết quả cho mỗi lượt điểm danh khi quét thẻ.</a:t>
+              <a:t>Quản lý thông tin cán bộ, sinh viên bằng các thao tác thêm, cập nhật, xóa, tìm kiếm.</a:t>
             </a:r>
           </a:p>
           <a:p>
             <a:r>
               <a:rPr lang="en-US" sz="2000"/>
-              <a:t>Tổng hợp kết quả điểm danh, hiển thị biểu đồ thống kê.</a:t>
+              <a:t>Quản lý đăng ký thẻ: đăng ký thẻ mới, cập nhật thẻ cũ, hủy thẻ.</a:t>
             </a:r>
           </a:p>
           <a:p>
             <a:r>
               <a:rPr lang="en-US" sz="2000"/>
-              <a:t>Quản lý dữ liệu các sự kiện cần điểm, đã điểm danh, xem lại kết quả sự kiện cũ.</a:t>
+              <a:t>Quản lý sự kiện: tạo sự kiện, cập nhật, xóa, đăng ký danh sách tham dự, xem kết quả sự kiện đã điểm danh.</a:t>
             </a:r>
           </a:p>
           <a:p>
             <a:r>
               <a:rPr lang="en-US" sz="2000"/>
-              <a:t>Quản lý dữ liệu sinh viên, cán bộ và kết quả đăng ký thẻ cho cho cán bộ, sinh viên để sử dụng cho việc điểm danh.</a:t>
+              <a:t>Xác thực máy trạm điểm danh, tính kết quả cho mỗi lượt điểm danh bằng thẻ RFID.</a:t>
+            </a:r>
+          </a:p>
+          <a:p>
+            <a:r>
+              <a:rPr lang="en-US" sz="2000"/>
+              <a:t>Tổng hợp kết quả điểm danh cho một sự kiện.</a:t>
             </a:r>
           </a:p>
         </p:txBody>
@@ -12138,6 +11418,67 @@
                                           <p:spTgt spid="13">
                                             <p:txEl>
                                               <p:pRg st="3" end="3"/>
+                                            </p:txEl>
+                                          </p:spTgt>
+                                        </p:tgtEl>
+                                      </p:cBhvr>
+                                    </p:animEffect>
+                                  </p:childTnLst>
+                                </p:cTn>
+                              </p:par>
+                            </p:childTnLst>
+                          </p:cTn>
+                        </p:par>
+                      </p:childTnLst>
+                    </p:cTn>
+                  </p:par>
+                  <p:par>
+                    <p:cTn id="23" fill="hold">
+                      <p:stCondLst>
+                        <p:cond delay="indefinite"/>
+                      </p:stCondLst>
+                      <p:childTnLst>
+                        <p:par>
+                          <p:cTn id="24" fill="hold">
+                            <p:stCondLst>
+                              <p:cond delay="0"/>
+                            </p:stCondLst>
+                            <p:childTnLst>
+                              <p:par>
+                                <p:cTn id="25" presetID="10" presetClass="entr" presetSubtype="0" fill="hold" nodeType="clickEffect">
+                                  <p:stCondLst>
+                                    <p:cond delay="0"/>
+                                  </p:stCondLst>
+                                  <p:childTnLst>
+                                    <p:set>
+                                      <p:cBhvr>
+                                        <p:cTn id="26" dur="1" fill="hold">
+                                          <p:stCondLst>
+                                            <p:cond delay="0"/>
+                                          </p:stCondLst>
+                                        </p:cTn>
+                                        <p:tgtEl>
+                                          <p:spTgt spid="13">
+                                            <p:txEl>
+                                              <p:pRg st="4" end="4"/>
+                                            </p:txEl>
+                                          </p:spTgt>
+                                        </p:tgtEl>
+                                        <p:attrNameLst>
+                                          <p:attrName>style.visibility</p:attrName>
+                                        </p:attrNameLst>
+                                      </p:cBhvr>
+                                      <p:to>
+                                        <p:strVal val="visible"/>
+                                      </p:to>
+                                    </p:set>
+                                    <p:animEffect transition="in" filter="fade">
+                                      <p:cBhvr>
+                                        <p:cTn id="27" dur="500"/>
+                                        <p:tgtEl>
+                                          <p:spTgt spid="13">
+                                            <p:txEl>
+                                              <p:pRg st="4" end="4"/>
                                             </p:txEl>
                                           </p:spTgt>
                                         </p:tgtEl>

</xml_diff>

<commit_message>
- Không cho phép xóa sự kiện khi đang điểm danh. - In hoa các kí tự đầu trong tên cb, sv và mssv
</commit_message>
<xml_diff>
--- a/Docs/Report/DD_RFID_FinalReport_v1.0.pptx
+++ b/Docs/Report/DD_RFID_FinalReport_v1.0.pptx
@@ -3290,7 +3290,7 @@
           <a:p>
             <a:fld id="{FBA972DB-F795-481F-9DDB-E98EB1FB6476}" type="datetimeFigureOut">
               <a:rPr lang="en-US" smtClean="0"/>
-              <a:t>23-11-17</a:t>
+              <a:t>24-11-17</a:t>
             </a:fld>
             <a:endParaRPr lang="en-US"/>
           </a:p>
@@ -6736,7 +6736,15 @@
           <a:p>
             <a:r>
               <a:rPr lang="vi-VN" sz="2000"/>
-              <a:t>Cái thiện giao diện đáp ứng tốt hơn cho người dùng trên di động.</a:t>
+              <a:t>C</a:t>
+            </a:r>
+            <a:r>
+              <a:rPr lang="en-US" sz="2000"/>
+              <a:t>ả</a:t>
+            </a:r>
+            <a:r>
+              <a:rPr lang="vi-VN" sz="2000"/>
+              <a:t>i thiện giao diện đáp ứng tốt hơn cho người dùng trên di động.</a:t>
             </a:r>
           </a:p>
           <a:p>
@@ -6748,11 +6756,11 @@
           <a:p>
             <a:r>
               <a:rPr lang="vi-VN" sz="2000"/>
-              <a:t>Mở rộng quy mô hệ thống cho nhiều khoa khác, tạo các chức năng quản lý dữ liệu khoa, chuyên ngành, tổ bộ môn.</a:t>
+              <a:t>Mở rộng quy mô hệ thống cho nhiều khoa khác, tạo các chức năng quản lý dữ liệu khoa, chuyên ngành, tổ bộ</a:t>
             </a:r>
             <a:r>
               <a:rPr lang="en-US" sz="2000"/>
-              <a:t>ả như thiết bị có kích thước lớn.</a:t>
+              <a:t> môn.</a:t>
             </a:r>
           </a:p>
         </p:txBody>
@@ -7792,7 +7800,7 @@
           <a:p>
             <a:r>
               <a:rPr lang="en-US"/>
-              <a:t>Phạm vi đề tại</a:t>
+              <a:t>Phạm vi đề tài</a:t>
             </a:r>
           </a:p>
           <a:p>
@@ -8765,7 +8773,23 @@
             <a:pPr lvl="1"/>
             <a:r>
               <a:rPr lang="vi-VN" sz="2000"/>
-              <a:t>Các kiến thức nền tản cho lập trình web.</a:t>
+              <a:t>Các kiến thức nền t</a:t>
+            </a:r>
+            <a:r>
+              <a:rPr lang="en-US" sz="2000"/>
+              <a:t>ả</a:t>
+            </a:r>
+            <a:r>
+              <a:rPr lang="vi-VN" sz="2000"/>
+              <a:t>n</a:t>
+            </a:r>
+            <a:r>
+              <a:rPr lang="en-US" sz="2000"/>
+              <a:t>g</a:t>
+            </a:r>
+            <a:r>
+              <a:rPr lang="vi-VN" sz="2000"/>
+              <a:t> cho lập trình web.</a:t>
             </a:r>
           </a:p>
           <a:p>

</xml_diff>

<commit_message>
- Sửa lỗi không cập nhật trạng thái điểm danh khi đã đếm hết đồng hồ. (BUG FIXED)
</commit_message>
<xml_diff>
--- a/Docs/Report/DD_RFID_FinalReport_v1.0.pptx
+++ b/Docs/Report/DD_RFID_FinalReport_v1.0.pptx
@@ -5317,8 +5317,8 @@
         </p:nvSpPr>
         <p:spPr>
           <a:xfrm>
-            <a:off x="1066800" y="2732782"/>
-            <a:ext cx="7086600" cy="1077218"/>
+            <a:off x="0" y="2890391"/>
+            <a:ext cx="9144000" cy="1077218"/>
           </a:xfrm>
           <a:prstGeom prst="rect">
             <a:avLst/>
@@ -5338,7 +5338,18 @@
                   <a:srgbClr val="FF0000"/>
                 </a:solidFill>
               </a:rPr>
-              <a:t>ỨNG DỤNG WEB ĐIỂM DANH SỰ KIỆN KHOA VỚI CÔNG NGHỆ RFID</a:t>
+              <a:t>ỨNG DỤNG WEB ĐIỂM DANH SỰ KIỆN KHOA </a:t>
+            </a:r>
+          </a:p>
+          <a:p>
+            <a:pPr algn="ctr"/>
+            <a:r>
+              <a:rPr lang="en-US" sz="3200" b="1">
+                <a:solidFill>
+                  <a:srgbClr val="FF0000"/>
+                </a:solidFill>
+              </a:rPr>
+              <a:t>VỚI CÔNG NGHỆ RFID</a:t>
             </a:r>
           </a:p>
         </p:txBody>

</xml_diff>